<commit_message>
README.md , portfolio.pptx updated (date uncorrect)
</commit_message>
<xml_diff>
--- a/심재철PT.pptx
+++ b/심재철PT.pptx
@@ -20,18 +20,18 @@
   <p:notesSz cx="6858000" cy="9144000"/>
   <p:embeddedFontLst>
     <p:embeddedFont>
-      <p:font typeface="Ultra" panose="020B0600000101010101" charset="0"/>
+      <p:font typeface="맑은 고딕" panose="020B0503020000020004" pitchFamily="34" charset="-127"/>
       <p:regular r:id="rId10"/>
+      <p:bold r:id="rId11"/>
     </p:embeddedFont>
     <p:embeddedFont>
-      <p:font typeface="맑은 고딕" panose="020B0503020000020004" pitchFamily="50" charset="-127"/>
-      <p:regular r:id="rId11"/>
-      <p:bold r:id="rId12"/>
+      <p:font typeface="맑은 고딕" panose="020B0503020000020004" pitchFamily="34" charset="-127"/>
+      <p:regular r:id="rId10"/>
+      <p:bold r:id="rId11"/>
     </p:embeddedFont>
     <p:embeddedFont>
-      <p:font typeface="맑은 고딕" panose="020B0503020000020004" pitchFamily="50" charset="-127"/>
-      <p:regular r:id="rId11"/>
-      <p:bold r:id="rId12"/>
+      <p:font typeface="Ultra" panose="020B0604020202020204" charset="0"/>
+      <p:regular r:id="rId12"/>
     </p:embeddedFont>
   </p:embeddedFontLst>
   <p:defaultTextStyle>
@@ -268,7 +268,7 @@
       <p15:sldGuideLst xmlns:p15="http://schemas.microsoft.com/office/powerpoint/2012/main"/>
     </p:ext>
     <p:ext uri="http://customooxmlschemas.google.com/">
-      <go:slidesCustomData xmlns="" xmlns:mc="http://schemas.openxmlformats.org/markup-compatibility/2006" xmlns:mv="urn:schemas-microsoft-com:mac:vml" xmlns:c="http://schemas.openxmlformats.org/drawingml/2006/chart" xmlns:dgm="http://schemas.openxmlformats.org/drawingml/2006/diagram" xmlns:o="urn:schemas-microsoft-com:office:office" xmlns:v="urn:schemas-microsoft-com:vml" xmlns:pvml="urn:schemas-microsoft-com:office:powerpoint" xmlns:com="http://schemas.openxmlformats.org/drawingml/2006/compatibility" xmlns:p14="http://schemas.microsoft.com/office/powerpoint/2010/main" xmlns:p15="http://schemas.microsoft.com/office/powerpoint/2012/main" xmlns:ahyp="http://schemas.microsoft.com/office/drawing/2018/hyperlinkcolor" xmlns:go="http://customooxmlschemas.google.com/" r:id="rId13" roundtripDataSignature="AMtx7mir7xK3h8ozp240malrxP9P7Cxakg=="/>
+      <go:slidesCustomData xmlns:go="http://customooxmlschemas.google.com/" xmlns:ahyp="http://schemas.microsoft.com/office/drawing/2018/hyperlinkcolor" xmlns:p15="http://schemas.microsoft.com/office/powerpoint/2012/main" xmlns:p14="http://schemas.microsoft.com/office/powerpoint/2010/main" xmlns:com="http://schemas.openxmlformats.org/drawingml/2006/compatibility" xmlns:pvml="urn:schemas-microsoft-com:office:powerpoint" xmlns:v="urn:schemas-microsoft-com:vml" xmlns:o="urn:schemas-microsoft-com:office:office" xmlns:dgm="http://schemas.openxmlformats.org/drawingml/2006/diagram" xmlns:c="http://schemas.openxmlformats.org/drawingml/2006/chart" xmlns:mv="urn:schemas-microsoft-com:mac:vml" xmlns:mc="http://schemas.openxmlformats.org/markup-compatibility/2006" xmlns="" r:id="rId13" roundtripDataSignature="AMtx7mir7xK3h8ozp240malrxP9P7Cxakg=="/>
     </p:ext>
   </p:extLst>
 </p:presentation>
@@ -277,1047 +277,10 @@
 <file path=ppt/revisionInfo.xml><?xml version="1.0" encoding="utf-8"?>
 <p1510:revInfo xmlns:a="http://schemas.openxmlformats.org/drawingml/2006/main" xmlns:r="http://schemas.openxmlformats.org/officeDocument/2006/relationships" xmlns:p1510="http://schemas.microsoft.com/office/powerpoint/2015/10/main">
   <p1510:revLst>
+    <p1510:client id="{4B9A747D-16EF-41F2-A613-C68580D3C299}" v="14" dt="2023-05-31T09:01:00.941"/>
     <p1510:client id="{9EDF1267-4813-4B5F-85AB-249D276E7A6A}" v="36" dt="2023-02-20T02:09:20.277"/>
   </p1510:revLst>
 </p1510:revInfo>
-</file>
-
-<file path=ppt/changesInfos/changesInfo1.xml><?xml version="1.0" encoding="utf-8"?>
-<pc:chgInfo xmlns:a="http://schemas.openxmlformats.org/drawingml/2006/main" xmlns:r="http://schemas.openxmlformats.org/officeDocument/2006/relationships" xmlns:ac="http://schemas.microsoft.com/office/drawing/2013/main/command" xmlns:pc="http://schemas.microsoft.com/office/powerpoint/2013/main/command">
-  <pc:docChgLst>
-    <pc:chgData name="심 재철" userId="3a7cd7161df145aa" providerId="LiveId" clId="{037FCC9E-04C0-4F23-B281-736C18B045C9}"/>
-    <pc:docChg chg="custSel modSld">
-      <pc:chgData name="심 재철" userId="3a7cd7161df145aa" providerId="LiveId" clId="{037FCC9E-04C0-4F23-B281-736C18B045C9}" dt="2023-01-13T03:22:18.127" v="33" actId="478"/>
-      <pc:docMkLst>
-        <pc:docMk/>
-      </pc:docMkLst>
-      <pc:sldChg chg="addSp delSp modSp mod">
-        <pc:chgData name="심 재철" userId="3a7cd7161df145aa" providerId="LiveId" clId="{037FCC9E-04C0-4F23-B281-736C18B045C9}" dt="2023-01-13T03:22:18.127" v="33" actId="478"/>
-        <pc:sldMkLst>
-          <pc:docMk/>
-          <pc:sldMk cId="3425561884" sldId="263"/>
-        </pc:sldMkLst>
-        <pc:spChg chg="add del mod">
-          <ac:chgData name="심 재철" userId="3a7cd7161df145aa" providerId="LiveId" clId="{037FCC9E-04C0-4F23-B281-736C18B045C9}" dt="2023-01-13T03:22:18.127" v="33" actId="478"/>
-          <ac:spMkLst>
-            <pc:docMk/>
-            <pc:sldMk cId="3425561884" sldId="263"/>
-            <ac:spMk id="2" creationId="{0975CAB9-4975-4BEF-A7B2-0E32992F7D3C}"/>
-          </ac:spMkLst>
-        </pc:spChg>
-      </pc:sldChg>
-    </pc:docChg>
-  </pc:docChgLst>
-  <pc:docChgLst>
-    <pc:chgData name="심 재철" userId="3a7cd7161df145aa" providerId="LiveId" clId="{9EDF1267-4813-4B5F-85AB-249D276E7A6A}"/>
-    <pc:docChg chg="undo custSel addSld delSld modSld">
-      <pc:chgData name="심 재철" userId="3a7cd7161df145aa" providerId="LiveId" clId="{9EDF1267-4813-4B5F-85AB-249D276E7A6A}" dt="2023-02-20T02:09:20.277" v="260"/>
-      <pc:docMkLst>
-        <pc:docMk/>
-      </pc:docMkLst>
-      <pc:sldChg chg="addSp delSp modSp mod">
-        <pc:chgData name="심 재철" userId="3a7cd7161df145aa" providerId="LiveId" clId="{9EDF1267-4813-4B5F-85AB-249D276E7A6A}" dt="2023-02-20T02:08:35.568" v="245" actId="1076"/>
-        <pc:sldMkLst>
-          <pc:docMk/>
-          <pc:sldMk cId="0" sldId="256"/>
-        </pc:sldMkLst>
-        <pc:spChg chg="mod">
-          <ac:chgData name="심 재철" userId="3a7cd7161df145aa" providerId="LiveId" clId="{9EDF1267-4813-4B5F-85AB-249D276E7A6A}" dt="2023-02-16T06:21:20.728" v="39" actId="1076"/>
-          <ac:spMkLst>
-            <pc:docMk/>
-            <pc:sldMk cId="0" sldId="256"/>
-            <ac:spMk id="54" creationId="{00000000-0000-0000-0000-000000000000}"/>
-          </ac:spMkLst>
-        </pc:spChg>
-        <pc:spChg chg="mod">
-          <ac:chgData name="심 재철" userId="3a7cd7161df145aa" providerId="LiveId" clId="{9EDF1267-4813-4B5F-85AB-249D276E7A6A}" dt="2023-02-16T06:20:59.120" v="35" actId="207"/>
-          <ac:spMkLst>
-            <pc:docMk/>
-            <pc:sldMk cId="0" sldId="256"/>
-            <ac:spMk id="59" creationId="{00000000-0000-0000-0000-000000000000}"/>
-          </ac:spMkLst>
-        </pc:spChg>
-        <pc:spChg chg="mod">
-          <ac:chgData name="심 재철" userId="3a7cd7161df145aa" providerId="LiveId" clId="{9EDF1267-4813-4B5F-85AB-249D276E7A6A}" dt="2023-02-16T06:19:29.076" v="1" actId="114"/>
-          <ac:spMkLst>
-            <pc:docMk/>
-            <pc:sldMk cId="0" sldId="256"/>
-            <ac:spMk id="70" creationId="{00000000-0000-0000-0000-000000000000}"/>
-          </ac:spMkLst>
-        </pc:spChg>
-        <pc:picChg chg="del">
-          <ac:chgData name="심 재철" userId="3a7cd7161df145aa" providerId="LiveId" clId="{9EDF1267-4813-4B5F-85AB-249D276E7A6A}" dt="2023-02-16T06:19:31.456" v="2" actId="478"/>
-          <ac:picMkLst>
-            <pc:docMk/>
-            <pc:sldMk cId="0" sldId="256"/>
-            <ac:picMk id="2" creationId="{097E219F-9C51-4022-BEBA-DFA2D4DBFF19}"/>
-          </ac:picMkLst>
-        </pc:picChg>
-        <pc:picChg chg="add del">
-          <ac:chgData name="심 재철" userId="3a7cd7161df145aa" providerId="LiveId" clId="{9EDF1267-4813-4B5F-85AB-249D276E7A6A}" dt="2023-02-20T02:08:11.680" v="237" actId="22"/>
-          <ac:picMkLst>
-            <pc:docMk/>
-            <pc:sldMk cId="0" sldId="256"/>
-            <ac:picMk id="3" creationId="{0D864A7F-C746-35C6-1313-540C31457528}"/>
-          </ac:picMkLst>
-        </pc:picChg>
-        <pc:picChg chg="add del mod">
-          <ac:chgData name="심 재철" userId="3a7cd7161df145aa" providerId="LiveId" clId="{9EDF1267-4813-4B5F-85AB-249D276E7A6A}" dt="2023-02-20T02:08:19.728" v="239" actId="478"/>
-          <ac:picMkLst>
-            <pc:docMk/>
-            <pc:sldMk cId="0" sldId="256"/>
-            <ac:picMk id="4" creationId="{2CA03EE5-2825-9914-F8E7-E8E48D98B404}"/>
-          </ac:picMkLst>
-        </pc:picChg>
-        <pc:picChg chg="add mod">
-          <ac:chgData name="심 재철" userId="3a7cd7161df145aa" providerId="LiveId" clId="{9EDF1267-4813-4B5F-85AB-249D276E7A6A}" dt="2023-02-20T02:08:35.568" v="245" actId="1076"/>
-          <ac:picMkLst>
-            <pc:docMk/>
-            <pc:sldMk cId="0" sldId="256"/>
-            <ac:picMk id="6" creationId="{613030AF-11B2-F09B-8B9D-E93204F21E21}"/>
-          </ac:picMkLst>
-        </pc:picChg>
-        <pc:cxnChg chg="mod">
-          <ac:chgData name="심 재철" userId="3a7cd7161df145aa" providerId="LiveId" clId="{9EDF1267-4813-4B5F-85AB-249D276E7A6A}" dt="2023-02-16T06:21:20.285" v="38" actId="14100"/>
-          <ac:cxnSpMkLst>
-            <pc:docMk/>
-            <pc:sldMk cId="0" sldId="256"/>
-            <ac:cxnSpMk id="55" creationId="{00000000-0000-0000-0000-000000000000}"/>
-          </ac:cxnSpMkLst>
-        </pc:cxnChg>
-      </pc:sldChg>
-      <pc:sldChg chg="addSp delSp modSp mod">
-        <pc:chgData name="심 재철" userId="3a7cd7161df145aa" providerId="LiveId" clId="{9EDF1267-4813-4B5F-85AB-249D276E7A6A}" dt="2023-02-20T02:08:51.464" v="248" actId="1076"/>
-        <pc:sldMkLst>
-          <pc:docMk/>
-          <pc:sldMk cId="0" sldId="257"/>
-        </pc:sldMkLst>
-        <pc:spChg chg="mod">
-          <ac:chgData name="심 재철" userId="3a7cd7161df145aa" providerId="LiveId" clId="{9EDF1267-4813-4B5F-85AB-249D276E7A6A}" dt="2023-02-16T06:23:04.712" v="76" actId="1076"/>
-          <ac:spMkLst>
-            <pc:docMk/>
-            <pc:sldMk cId="0" sldId="257"/>
-            <ac:spMk id="11" creationId="{6CD9F7B1-7F71-45F3-AB02-7D6D4E76A03E}"/>
-          </ac:spMkLst>
-        </pc:spChg>
-        <pc:spChg chg="add del mod">
-          <ac:chgData name="심 재철" userId="3a7cd7161df145aa" providerId="LiveId" clId="{9EDF1267-4813-4B5F-85AB-249D276E7A6A}" dt="2023-02-16T06:22:45.535" v="66" actId="478"/>
-          <ac:spMkLst>
-            <pc:docMk/>
-            <pc:sldMk cId="0" sldId="257"/>
-            <ac:spMk id="30" creationId="{A183F962-6D01-4746-9F7F-4E30D0B54EA5}"/>
-          </ac:spMkLst>
-        </pc:spChg>
-        <pc:spChg chg="del">
-          <ac:chgData name="심 재철" userId="3a7cd7161df145aa" providerId="LiveId" clId="{9EDF1267-4813-4B5F-85AB-249D276E7A6A}" dt="2023-02-16T06:21:52.370" v="48" actId="478"/>
-          <ac:spMkLst>
-            <pc:docMk/>
-            <pc:sldMk cId="0" sldId="257"/>
-            <ac:spMk id="87" creationId="{00000000-0000-0000-0000-000000000000}"/>
-          </ac:spMkLst>
-        </pc:spChg>
-        <pc:spChg chg="mod">
-          <ac:chgData name="심 재철" userId="3a7cd7161df145aa" providerId="LiveId" clId="{9EDF1267-4813-4B5F-85AB-249D276E7A6A}" dt="2023-02-16T06:23:04.906" v="77" actId="122"/>
-          <ac:spMkLst>
-            <pc:docMk/>
-            <pc:sldMk cId="0" sldId="257"/>
-            <ac:spMk id="89" creationId="{00000000-0000-0000-0000-000000000000}"/>
-          </ac:spMkLst>
-        </pc:spChg>
-        <pc:picChg chg="add del mod">
-          <ac:chgData name="심 재철" userId="3a7cd7161df145aa" providerId="LiveId" clId="{9EDF1267-4813-4B5F-85AB-249D276E7A6A}" dt="2023-02-20T02:08:47.174" v="247" actId="478"/>
-          <ac:picMkLst>
-            <pc:docMk/>
-            <pc:sldMk cId="0" sldId="257"/>
-            <ac:picMk id="2" creationId="{29142921-6456-E966-1350-26F7AB232057}"/>
-          </ac:picMkLst>
-        </pc:picChg>
-        <pc:picChg chg="add mod">
-          <ac:chgData name="심 재철" userId="3a7cd7161df145aa" providerId="LiveId" clId="{9EDF1267-4813-4B5F-85AB-249D276E7A6A}" dt="2023-02-20T02:08:51.464" v="248" actId="1076"/>
-          <ac:picMkLst>
-            <pc:docMk/>
-            <pc:sldMk cId="0" sldId="257"/>
-            <ac:picMk id="3" creationId="{DB299F71-7454-661E-2539-E2A43DD55A3A}"/>
-          </ac:picMkLst>
-        </pc:picChg>
-        <pc:picChg chg="del">
-          <ac:chgData name="심 재철" userId="3a7cd7161df145aa" providerId="LiveId" clId="{9EDF1267-4813-4B5F-85AB-249D276E7A6A}" dt="2023-02-16T06:21:29.112" v="40" actId="478"/>
-          <ac:picMkLst>
-            <pc:docMk/>
-            <pc:sldMk cId="0" sldId="257"/>
-            <ac:picMk id="34" creationId="{3AD78F5A-D4D9-4C94-8039-1FC1B71C9062}"/>
-          </ac:picMkLst>
-        </pc:picChg>
-        <pc:cxnChg chg="mod">
-          <ac:chgData name="심 재철" userId="3a7cd7161df145aa" providerId="LiveId" clId="{9EDF1267-4813-4B5F-85AB-249D276E7A6A}" dt="2023-02-16T06:22:33.680" v="63" actId="208"/>
-          <ac:cxnSpMkLst>
-            <pc:docMk/>
-            <pc:sldMk cId="0" sldId="257"/>
-            <ac:cxnSpMk id="78" creationId="{00000000-0000-0000-0000-000000000000}"/>
-          </ac:cxnSpMkLst>
-        </pc:cxnChg>
-        <pc:cxnChg chg="mod">
-          <ac:chgData name="심 재철" userId="3a7cd7161df145aa" providerId="LiveId" clId="{9EDF1267-4813-4B5F-85AB-249D276E7A6A}" dt="2023-02-16T06:29:25.688" v="162" actId="208"/>
-          <ac:cxnSpMkLst>
-            <pc:docMk/>
-            <pc:sldMk cId="0" sldId="257"/>
-            <ac:cxnSpMk id="79" creationId="{00000000-0000-0000-0000-000000000000}"/>
-          </ac:cxnSpMkLst>
-        </pc:cxnChg>
-        <pc:cxnChg chg="mod">
-          <ac:chgData name="심 재철" userId="3a7cd7161df145aa" providerId="LiveId" clId="{9EDF1267-4813-4B5F-85AB-249D276E7A6A}" dt="2023-02-16T06:29:31.324" v="163" actId="208"/>
-          <ac:cxnSpMkLst>
-            <pc:docMk/>
-            <pc:sldMk cId="0" sldId="257"/>
-            <ac:cxnSpMk id="80" creationId="{00000000-0000-0000-0000-000000000000}"/>
-          </ac:cxnSpMkLst>
-        </pc:cxnChg>
-        <pc:cxnChg chg="mod">
-          <ac:chgData name="심 재철" userId="3a7cd7161df145aa" providerId="LiveId" clId="{9EDF1267-4813-4B5F-85AB-249D276E7A6A}" dt="2023-02-16T06:29:35.259" v="164" actId="208"/>
-          <ac:cxnSpMkLst>
-            <pc:docMk/>
-            <pc:sldMk cId="0" sldId="257"/>
-            <ac:cxnSpMk id="91" creationId="{00000000-0000-0000-0000-000000000000}"/>
-          </ac:cxnSpMkLst>
-        </pc:cxnChg>
-        <pc:cxnChg chg="mod">
-          <ac:chgData name="심 재철" userId="3a7cd7161df145aa" providerId="LiveId" clId="{9EDF1267-4813-4B5F-85AB-249D276E7A6A}" dt="2023-02-16T06:29:39.274" v="165" actId="208"/>
-          <ac:cxnSpMkLst>
-            <pc:docMk/>
-            <pc:sldMk cId="0" sldId="257"/>
-            <ac:cxnSpMk id="98" creationId="{00000000-0000-0000-0000-000000000000}"/>
-          </ac:cxnSpMkLst>
-        </pc:cxnChg>
-      </pc:sldChg>
-      <pc:sldChg chg="addSp delSp modSp mod">
-        <pc:chgData name="심 재철" userId="3a7cd7161df145aa" providerId="LiveId" clId="{9EDF1267-4813-4B5F-85AB-249D276E7A6A}" dt="2023-02-20T02:08:57.195" v="250"/>
-        <pc:sldMkLst>
-          <pc:docMk/>
-          <pc:sldMk cId="0" sldId="258"/>
-        </pc:sldMkLst>
-        <pc:spChg chg="add del mod">
-          <ac:chgData name="심 재철" userId="3a7cd7161df145aa" providerId="LiveId" clId="{9EDF1267-4813-4B5F-85AB-249D276E7A6A}" dt="2023-02-16T06:23:55.630" v="88"/>
-          <ac:spMkLst>
-            <pc:docMk/>
-            <pc:sldMk cId="0" sldId="258"/>
-            <ac:spMk id="2" creationId="{3F6DB5D0-E8E3-70AF-3089-562377065B8C}"/>
-          </ac:spMkLst>
-        </pc:spChg>
-        <pc:spChg chg="add del mod">
-          <ac:chgData name="심 재철" userId="3a7cd7161df145aa" providerId="LiveId" clId="{9EDF1267-4813-4B5F-85AB-249D276E7A6A}" dt="2023-02-16T06:23:55.630" v="88"/>
-          <ac:spMkLst>
-            <pc:docMk/>
-            <pc:sldMk cId="0" sldId="258"/>
-            <ac:spMk id="3" creationId="{99E1161D-FEBE-A95D-4B41-89716A16BE18}"/>
-          </ac:spMkLst>
-        </pc:spChg>
-        <pc:spChg chg="add del mod">
-          <ac:chgData name="심 재철" userId="3a7cd7161df145aa" providerId="LiveId" clId="{9EDF1267-4813-4B5F-85AB-249D276E7A6A}" dt="2023-02-16T06:23:55.630" v="88"/>
-          <ac:spMkLst>
-            <pc:docMk/>
-            <pc:sldMk cId="0" sldId="258"/>
-            <ac:spMk id="4" creationId="{AD5CC438-D425-0C47-B6CF-02A128D0C3D3}"/>
-          </ac:spMkLst>
-        </pc:spChg>
-        <pc:spChg chg="add del mod">
-          <ac:chgData name="심 재철" userId="3a7cd7161df145aa" providerId="LiveId" clId="{9EDF1267-4813-4B5F-85AB-249D276E7A6A}" dt="2023-02-16T06:23:55.630" v="88"/>
-          <ac:spMkLst>
-            <pc:docMk/>
-            <pc:sldMk cId="0" sldId="258"/>
-            <ac:spMk id="5" creationId="{9D70BC7F-D32C-AA72-CB43-24CA7F53B9D9}"/>
-          </ac:spMkLst>
-        </pc:spChg>
-        <pc:spChg chg="add mod">
-          <ac:chgData name="심 재철" userId="3a7cd7161df145aa" providerId="LiveId" clId="{9EDF1267-4813-4B5F-85AB-249D276E7A6A}" dt="2023-02-16T06:24:05.221" v="92"/>
-          <ac:spMkLst>
-            <pc:docMk/>
-            <pc:sldMk cId="0" sldId="258"/>
-            <ac:spMk id="10" creationId="{DC3CB337-4F9B-BA87-F0FF-98895BD60F9E}"/>
-          </ac:spMkLst>
-        </pc:spChg>
-        <pc:spChg chg="add mod">
-          <ac:chgData name="심 재철" userId="3a7cd7161df145aa" providerId="LiveId" clId="{9EDF1267-4813-4B5F-85AB-249D276E7A6A}" dt="2023-02-16T06:24:05.221" v="92"/>
-          <ac:spMkLst>
-            <pc:docMk/>
-            <pc:sldMk cId="0" sldId="258"/>
-            <ac:spMk id="11" creationId="{DBAA6997-F6CF-2025-22E5-6082CC54B618}"/>
-          </ac:spMkLst>
-        </pc:spChg>
-        <pc:spChg chg="add mod">
-          <ac:chgData name="심 재철" userId="3a7cd7161df145aa" providerId="LiveId" clId="{9EDF1267-4813-4B5F-85AB-249D276E7A6A}" dt="2023-02-16T06:24:05.221" v="92"/>
-          <ac:spMkLst>
-            <pc:docMk/>
-            <pc:sldMk cId="0" sldId="258"/>
-            <ac:spMk id="12" creationId="{E27E1BE1-2D47-8BEB-899D-7A6F6DCE628F}"/>
-          </ac:spMkLst>
-        </pc:spChg>
-        <pc:spChg chg="add mod">
-          <ac:chgData name="심 재철" userId="3a7cd7161df145aa" providerId="LiveId" clId="{9EDF1267-4813-4B5F-85AB-249D276E7A6A}" dt="2023-02-16T06:24:05.221" v="92"/>
-          <ac:spMkLst>
-            <pc:docMk/>
-            <pc:sldMk cId="0" sldId="258"/>
-            <ac:spMk id="13" creationId="{85213124-0A04-B5E5-9AA0-BAD26EBCD066}"/>
-          </ac:spMkLst>
-        </pc:spChg>
-        <pc:spChg chg="add mod">
-          <ac:chgData name="심 재철" userId="3a7cd7161df145aa" providerId="LiveId" clId="{9EDF1267-4813-4B5F-85AB-249D276E7A6A}" dt="2023-02-16T06:30:43.599" v="178" actId="115"/>
-          <ac:spMkLst>
-            <pc:docMk/>
-            <pc:sldMk cId="0" sldId="258"/>
-            <ac:spMk id="14" creationId="{C6E7AA95-858A-4AB6-D65E-1A834382429F}"/>
-          </ac:spMkLst>
-        </pc:spChg>
-        <pc:spChg chg="add del">
-          <ac:chgData name="심 재철" userId="3a7cd7161df145aa" providerId="LiveId" clId="{9EDF1267-4813-4B5F-85AB-249D276E7A6A}" dt="2023-02-16T06:24:04.405" v="91" actId="478"/>
-          <ac:spMkLst>
-            <pc:docMk/>
-            <pc:sldMk cId="0" sldId="258"/>
-            <ac:spMk id="33" creationId="{EF950688-7B8C-4425-802E-F4115D99CBDD}"/>
-          </ac:spMkLst>
-        </pc:spChg>
-        <pc:spChg chg="add del">
-          <ac:chgData name="심 재철" userId="3a7cd7161df145aa" providerId="LiveId" clId="{9EDF1267-4813-4B5F-85AB-249D276E7A6A}" dt="2023-02-16T06:24:04.405" v="91" actId="478"/>
-          <ac:spMkLst>
-            <pc:docMk/>
-            <pc:sldMk cId="0" sldId="258"/>
-            <ac:spMk id="34" creationId="{6A1B3B77-8A2A-48D4-907D-968DC4061113}"/>
-          </ac:spMkLst>
-        </pc:spChg>
-        <pc:spChg chg="add del">
-          <ac:chgData name="심 재철" userId="3a7cd7161df145aa" providerId="LiveId" clId="{9EDF1267-4813-4B5F-85AB-249D276E7A6A}" dt="2023-02-16T06:24:04.405" v="91" actId="478"/>
-          <ac:spMkLst>
-            <pc:docMk/>
-            <pc:sldMk cId="0" sldId="258"/>
-            <ac:spMk id="35" creationId="{F3B00E7D-C840-49B7-9CCE-2F524EA87B15}"/>
-          </ac:spMkLst>
-        </pc:spChg>
-        <pc:spChg chg="add del">
-          <ac:chgData name="심 재철" userId="3a7cd7161df145aa" providerId="LiveId" clId="{9EDF1267-4813-4B5F-85AB-249D276E7A6A}" dt="2023-02-16T06:24:04.405" v="91" actId="478"/>
-          <ac:spMkLst>
-            <pc:docMk/>
-            <pc:sldMk cId="0" sldId="258"/>
-            <ac:spMk id="36" creationId="{3CF18F20-DC0F-4880-B660-68BACC86F2F2}"/>
-          </ac:spMkLst>
-        </pc:spChg>
-        <pc:spChg chg="add del">
-          <ac:chgData name="심 재철" userId="3a7cd7161df145aa" providerId="LiveId" clId="{9EDF1267-4813-4B5F-85AB-249D276E7A6A}" dt="2023-02-16T06:24:04.405" v="91" actId="478"/>
-          <ac:spMkLst>
-            <pc:docMk/>
-            <pc:sldMk cId="0" sldId="258"/>
-            <ac:spMk id="37" creationId="{355D8FC0-D3C6-408A-88F0-B2F3F5993BDD}"/>
-          </ac:spMkLst>
-        </pc:spChg>
-        <pc:spChg chg="mod">
-          <ac:chgData name="심 재철" userId="3a7cd7161df145aa" providerId="LiveId" clId="{9EDF1267-4813-4B5F-85AB-249D276E7A6A}" dt="2023-02-16T06:29:53.286" v="167" actId="207"/>
-          <ac:spMkLst>
-            <pc:docMk/>
-            <pc:sldMk cId="0" sldId="258"/>
-            <ac:spMk id="55" creationId="{A3272428-6259-4EB1-9687-C7C4D52BC91C}"/>
-          </ac:spMkLst>
-        </pc:spChg>
-        <pc:spChg chg="mod">
-          <ac:chgData name="심 재철" userId="3a7cd7161df145aa" providerId="LiveId" clId="{9EDF1267-4813-4B5F-85AB-249D276E7A6A}" dt="2023-02-16T06:30:05.340" v="169" actId="208"/>
-          <ac:spMkLst>
-            <pc:docMk/>
-            <pc:sldMk cId="0" sldId="258"/>
-            <ac:spMk id="60" creationId="{D4627A6D-44E3-435B-B6E8-F87FF4CF8401}"/>
-          </ac:spMkLst>
-        </pc:spChg>
-        <pc:spChg chg="mod">
-          <ac:chgData name="심 재철" userId="3a7cd7161df145aa" providerId="LiveId" clId="{9EDF1267-4813-4B5F-85AB-249D276E7A6A}" dt="2023-02-16T06:30:15.176" v="171" actId="208"/>
-          <ac:spMkLst>
-            <pc:docMk/>
-            <pc:sldMk cId="0" sldId="258"/>
-            <ac:spMk id="65" creationId="{C064B8AE-A323-44AA-A22D-972CD1F96C41}"/>
-          </ac:spMkLst>
-        </pc:spChg>
-        <pc:picChg chg="add mod">
-          <ac:chgData name="심 재철" userId="3a7cd7161df145aa" providerId="LiveId" clId="{9EDF1267-4813-4B5F-85AB-249D276E7A6A}" dt="2023-02-20T02:08:57.195" v="250"/>
-          <ac:picMkLst>
-            <pc:docMk/>
-            <pc:sldMk cId="0" sldId="258"/>
-            <ac:picMk id="2" creationId="{5F527224-FA3B-3FD7-9BA1-B3BE8564A63D}"/>
-          </ac:picMkLst>
-        </pc:picChg>
-        <pc:picChg chg="add del mod">
-          <ac:chgData name="심 재철" userId="3a7cd7161df145aa" providerId="LiveId" clId="{9EDF1267-4813-4B5F-85AB-249D276E7A6A}" dt="2023-02-16T06:23:55.630" v="88"/>
-          <ac:picMkLst>
-            <pc:docMk/>
-            <pc:sldMk cId="0" sldId="258"/>
-            <ac:picMk id="6" creationId="{71E9C4FB-A4B1-BC60-5BAC-FB945A03AFCB}"/>
-          </ac:picMkLst>
-        </pc:picChg>
-        <pc:picChg chg="add del mod">
-          <ac:chgData name="심 재철" userId="3a7cd7161df145aa" providerId="LiveId" clId="{9EDF1267-4813-4B5F-85AB-249D276E7A6A}" dt="2023-02-16T06:32:16.308" v="223" actId="478"/>
-          <ac:picMkLst>
-            <pc:docMk/>
-            <pc:sldMk cId="0" sldId="258"/>
-            <ac:picMk id="15" creationId="{C8188F1A-F0B2-9223-D0CD-79F3958B870E}"/>
-          </ac:picMkLst>
-        </pc:picChg>
-        <pc:picChg chg="add del mod">
-          <ac:chgData name="심 재철" userId="3a7cd7161df145aa" providerId="LiveId" clId="{9EDF1267-4813-4B5F-85AB-249D276E7A6A}" dt="2023-02-20T02:08:56.497" v="249" actId="478"/>
-          <ac:picMkLst>
-            <pc:docMk/>
-            <pc:sldMk cId="0" sldId="258"/>
-            <ac:picMk id="16" creationId="{627D7D13-D0D3-CF44-29A3-4914E3F3DC56}"/>
-          </ac:picMkLst>
-        </pc:picChg>
-        <pc:picChg chg="add del">
-          <ac:chgData name="심 재철" userId="3a7cd7161df145aa" providerId="LiveId" clId="{9EDF1267-4813-4B5F-85AB-249D276E7A6A}" dt="2023-02-16T06:24:04.405" v="91" actId="478"/>
-          <ac:picMkLst>
-            <pc:docMk/>
-            <pc:sldMk cId="0" sldId="258"/>
-            <ac:picMk id="38" creationId="{763C0D49-1947-46CA-A55D-4775170A1F35}"/>
-          </ac:picMkLst>
-        </pc:picChg>
-        <pc:cxnChg chg="mod">
-          <ac:chgData name="심 재철" userId="3a7cd7161df145aa" providerId="LiveId" clId="{9EDF1267-4813-4B5F-85AB-249D276E7A6A}" dt="2023-02-16T06:30:34.147" v="174" actId="208"/>
-          <ac:cxnSpMkLst>
-            <pc:docMk/>
-            <pc:sldMk cId="0" sldId="258"/>
-            <ac:cxnSpMk id="118" creationId="{00000000-0000-0000-0000-000000000000}"/>
-          </ac:cxnSpMkLst>
-        </pc:cxnChg>
-      </pc:sldChg>
-      <pc:sldChg chg="addSp delSp modSp del mod">
-        <pc:chgData name="심 재철" userId="3a7cd7161df145aa" providerId="LiveId" clId="{9EDF1267-4813-4B5F-85AB-249D276E7A6A}" dt="2023-02-16T06:31:50.343" v="221" actId="47"/>
-        <pc:sldMkLst>
-          <pc:docMk/>
-          <pc:sldMk cId="0" sldId="262"/>
-        </pc:sldMkLst>
-        <pc:spChg chg="mod">
-          <ac:chgData name="심 재철" userId="3a7cd7161df145aa" providerId="LiveId" clId="{9EDF1267-4813-4B5F-85AB-249D276E7A6A}" dt="2023-02-16T06:31:24.795" v="186" actId="1076"/>
-          <ac:spMkLst>
-            <pc:docMk/>
-            <pc:sldMk cId="0" sldId="262"/>
-            <ac:spMk id="210" creationId="{00000000-0000-0000-0000-000000000000}"/>
-          </ac:spMkLst>
-        </pc:spChg>
-        <pc:picChg chg="add mod">
-          <ac:chgData name="심 재철" userId="3a7cd7161df145aa" providerId="LiveId" clId="{9EDF1267-4813-4B5F-85AB-249D276E7A6A}" dt="2023-02-16T06:31:17.992" v="184"/>
-          <ac:picMkLst>
-            <pc:docMk/>
-            <pc:sldMk cId="0" sldId="262"/>
-            <ac:picMk id="2" creationId="{5520330D-B1CA-0D99-9EF6-C3A8464E0702}"/>
-          </ac:picMkLst>
-        </pc:picChg>
-        <pc:picChg chg="del">
-          <ac:chgData name="심 재철" userId="3a7cd7161df145aa" providerId="LiveId" clId="{9EDF1267-4813-4B5F-85AB-249D276E7A6A}" dt="2023-02-16T06:31:14.832" v="183" actId="478"/>
-          <ac:picMkLst>
-            <pc:docMk/>
-            <pc:sldMk cId="0" sldId="262"/>
-            <ac:picMk id="19" creationId="{AF6A8152-129C-4194-B772-F7DF8CEB5AB7}"/>
-          </ac:picMkLst>
-        </pc:picChg>
-      </pc:sldChg>
-      <pc:sldChg chg="addSp delSp modSp mod">
-        <pc:chgData name="심 재철" userId="3a7cd7161df145aa" providerId="LiveId" clId="{9EDF1267-4813-4B5F-85AB-249D276E7A6A}" dt="2023-02-20T02:08:59.951" v="252"/>
-        <pc:sldMkLst>
-          <pc:docMk/>
-          <pc:sldMk cId="3425561884" sldId="263"/>
-        </pc:sldMkLst>
-        <pc:spChg chg="add del mod">
-          <ac:chgData name="심 재철" userId="3a7cd7161df145aa" providerId="LiveId" clId="{9EDF1267-4813-4B5F-85AB-249D276E7A6A}" dt="2023-02-16T06:23:34.396" v="82"/>
-          <ac:spMkLst>
-            <pc:docMk/>
-            <pc:sldMk cId="3425561884" sldId="263"/>
-            <ac:spMk id="2" creationId="{53079C5B-B245-0D3E-89F7-E9F882C45B2B}"/>
-          </ac:spMkLst>
-        </pc:spChg>
-        <pc:spChg chg="add del mod">
-          <ac:chgData name="심 재철" userId="3a7cd7161df145aa" providerId="LiveId" clId="{9EDF1267-4813-4B5F-85AB-249D276E7A6A}" dt="2023-02-16T06:23:34.396" v="82"/>
-          <ac:spMkLst>
-            <pc:docMk/>
-            <pc:sldMk cId="3425561884" sldId="263"/>
-            <ac:spMk id="3" creationId="{FC24498F-12B2-76B6-1EFC-4C5516D55EDB}"/>
-          </ac:spMkLst>
-        </pc:spChg>
-        <pc:spChg chg="add del mod">
-          <ac:chgData name="심 재철" userId="3a7cd7161df145aa" providerId="LiveId" clId="{9EDF1267-4813-4B5F-85AB-249D276E7A6A}" dt="2023-02-16T06:23:34.396" v="82"/>
-          <ac:spMkLst>
-            <pc:docMk/>
-            <pc:sldMk cId="3425561884" sldId="263"/>
-            <ac:spMk id="4" creationId="{069EFB64-439A-E837-0BD1-8E639965E6BD}"/>
-          </ac:spMkLst>
-        </pc:spChg>
-        <pc:spChg chg="add del mod">
-          <ac:chgData name="심 재철" userId="3a7cd7161df145aa" providerId="LiveId" clId="{9EDF1267-4813-4B5F-85AB-249D276E7A6A}" dt="2023-02-16T06:23:34.396" v="82"/>
-          <ac:spMkLst>
-            <pc:docMk/>
-            <pc:sldMk cId="3425561884" sldId="263"/>
-            <ac:spMk id="6" creationId="{2D4905DC-4942-A127-11FD-B48DF7292D7E}"/>
-          </ac:spMkLst>
-        </pc:spChg>
-        <pc:spChg chg="add del mod">
-          <ac:chgData name="심 재철" userId="3a7cd7161df145aa" providerId="LiveId" clId="{9EDF1267-4813-4B5F-85AB-249D276E7A6A}" dt="2023-02-16T06:23:47.834" v="85"/>
-          <ac:spMkLst>
-            <pc:docMk/>
-            <pc:sldMk cId="3425561884" sldId="263"/>
-            <ac:spMk id="11" creationId="{953CC89F-670C-7090-CBF9-B009FCA6821F}"/>
-          </ac:spMkLst>
-        </pc:spChg>
-        <pc:spChg chg="add del mod">
-          <ac:chgData name="심 재철" userId="3a7cd7161df145aa" providerId="LiveId" clId="{9EDF1267-4813-4B5F-85AB-249D276E7A6A}" dt="2023-02-16T06:23:47.834" v="85"/>
-          <ac:spMkLst>
-            <pc:docMk/>
-            <pc:sldMk cId="3425561884" sldId="263"/>
-            <ac:spMk id="12" creationId="{55AE6391-ADFB-B3C1-34A7-BB7B2240304F}"/>
-          </ac:spMkLst>
-        </pc:spChg>
-        <pc:spChg chg="add del mod">
-          <ac:chgData name="심 재철" userId="3a7cd7161df145aa" providerId="LiveId" clId="{9EDF1267-4813-4B5F-85AB-249D276E7A6A}" dt="2023-02-16T06:23:47.834" v="85"/>
-          <ac:spMkLst>
-            <pc:docMk/>
-            <pc:sldMk cId="3425561884" sldId="263"/>
-            <ac:spMk id="13" creationId="{7B4C9989-8E6A-4C14-594C-3EC88945A222}"/>
-          </ac:spMkLst>
-        </pc:spChg>
-        <pc:spChg chg="add del mod">
-          <ac:chgData name="심 재철" userId="3a7cd7161df145aa" providerId="LiveId" clId="{9EDF1267-4813-4B5F-85AB-249D276E7A6A}" dt="2023-02-16T06:23:47.834" v="85"/>
-          <ac:spMkLst>
-            <pc:docMk/>
-            <pc:sldMk cId="3425561884" sldId="263"/>
-            <ac:spMk id="14" creationId="{F772DCA9-DBDC-B507-9877-1E218BCB71FB}"/>
-          </ac:spMkLst>
-        </pc:spChg>
-        <pc:spChg chg="add mod">
-          <ac:chgData name="심 재철" userId="3a7cd7161df145aa" providerId="LiveId" clId="{9EDF1267-4813-4B5F-85AB-249D276E7A6A}" dt="2023-02-16T06:24:12.094" v="94"/>
-          <ac:spMkLst>
-            <pc:docMk/>
-            <pc:sldMk cId="3425561884" sldId="263"/>
-            <ac:spMk id="16" creationId="{59279031-1047-34AD-83E4-438D7DC10A31}"/>
-          </ac:spMkLst>
-        </pc:spChg>
-        <pc:spChg chg="add mod">
-          <ac:chgData name="심 재철" userId="3a7cd7161df145aa" providerId="LiveId" clId="{9EDF1267-4813-4B5F-85AB-249D276E7A6A}" dt="2023-02-16T06:24:12.094" v="94"/>
-          <ac:spMkLst>
-            <pc:docMk/>
-            <pc:sldMk cId="3425561884" sldId="263"/>
-            <ac:spMk id="17" creationId="{6BA8DC11-0540-06B8-CDF0-90A7211D4E84}"/>
-          </ac:spMkLst>
-        </pc:spChg>
-        <pc:spChg chg="add mod">
-          <ac:chgData name="심 재철" userId="3a7cd7161df145aa" providerId="LiveId" clId="{9EDF1267-4813-4B5F-85AB-249D276E7A6A}" dt="2023-02-16T06:24:12.094" v="94"/>
-          <ac:spMkLst>
-            <pc:docMk/>
-            <pc:sldMk cId="3425561884" sldId="263"/>
-            <ac:spMk id="18" creationId="{5E761D10-9904-C797-AA51-C7D7D23B2D3B}"/>
-          </ac:spMkLst>
-        </pc:spChg>
-        <pc:spChg chg="add mod">
-          <ac:chgData name="심 재철" userId="3a7cd7161df145aa" providerId="LiveId" clId="{9EDF1267-4813-4B5F-85AB-249D276E7A6A}" dt="2023-02-16T06:24:12.094" v="94"/>
-          <ac:spMkLst>
-            <pc:docMk/>
-            <pc:sldMk cId="3425561884" sldId="263"/>
-            <ac:spMk id="19" creationId="{0E3531B8-1A0D-6469-7961-340F3A923AC1}"/>
-          </ac:spMkLst>
-        </pc:spChg>
-        <pc:spChg chg="add mod">
-          <ac:chgData name="심 재철" userId="3a7cd7161df145aa" providerId="LiveId" clId="{9EDF1267-4813-4B5F-85AB-249D276E7A6A}" dt="2023-02-16T06:24:12.094" v="94"/>
-          <ac:spMkLst>
-            <pc:docMk/>
-            <pc:sldMk cId="3425561884" sldId="263"/>
-            <ac:spMk id="20" creationId="{F120C541-F67E-3DFD-3AE9-56956904D0D8}"/>
-          </ac:spMkLst>
-        </pc:spChg>
-        <pc:spChg chg="add del">
-          <ac:chgData name="심 재철" userId="3a7cd7161df145aa" providerId="LiveId" clId="{9EDF1267-4813-4B5F-85AB-249D276E7A6A}" dt="2023-02-16T06:24:11.404" v="93" actId="478"/>
-          <ac:spMkLst>
-            <pc:docMk/>
-            <pc:sldMk cId="3425561884" sldId="263"/>
-            <ac:spMk id="33" creationId="{EF950688-7B8C-4425-802E-F4115D99CBDD}"/>
-          </ac:spMkLst>
-        </pc:spChg>
-        <pc:spChg chg="add del">
-          <ac:chgData name="심 재철" userId="3a7cd7161df145aa" providerId="LiveId" clId="{9EDF1267-4813-4B5F-85AB-249D276E7A6A}" dt="2023-02-16T06:24:11.404" v="93" actId="478"/>
-          <ac:spMkLst>
-            <pc:docMk/>
-            <pc:sldMk cId="3425561884" sldId="263"/>
-            <ac:spMk id="34" creationId="{6A1B3B77-8A2A-48D4-907D-968DC4061113}"/>
-          </ac:spMkLst>
-        </pc:spChg>
-        <pc:spChg chg="add del">
-          <ac:chgData name="심 재철" userId="3a7cd7161df145aa" providerId="LiveId" clId="{9EDF1267-4813-4B5F-85AB-249D276E7A6A}" dt="2023-02-16T06:24:11.404" v="93" actId="478"/>
-          <ac:spMkLst>
-            <pc:docMk/>
-            <pc:sldMk cId="3425561884" sldId="263"/>
-            <ac:spMk id="35" creationId="{F3B00E7D-C840-49B7-9CCE-2F524EA87B15}"/>
-          </ac:spMkLst>
-        </pc:spChg>
-        <pc:spChg chg="add del">
-          <ac:chgData name="심 재철" userId="3a7cd7161df145aa" providerId="LiveId" clId="{9EDF1267-4813-4B5F-85AB-249D276E7A6A}" dt="2023-02-16T06:24:11.404" v="93" actId="478"/>
-          <ac:spMkLst>
-            <pc:docMk/>
-            <pc:sldMk cId="3425561884" sldId="263"/>
-            <ac:spMk id="36" creationId="{3CF18F20-DC0F-4880-B660-68BACC86F2F2}"/>
-          </ac:spMkLst>
-        </pc:spChg>
-        <pc:spChg chg="add del">
-          <ac:chgData name="심 재철" userId="3a7cd7161df145aa" providerId="LiveId" clId="{9EDF1267-4813-4B5F-85AB-249D276E7A6A}" dt="2023-02-16T06:24:11.404" v="93" actId="478"/>
-          <ac:spMkLst>
-            <pc:docMk/>
-            <pc:sldMk cId="3425561884" sldId="263"/>
-            <ac:spMk id="37" creationId="{355D8FC0-D3C6-408A-88F0-B2F3F5993BDD}"/>
-          </ac:spMkLst>
-        </pc:spChg>
-        <pc:spChg chg="mod">
-          <ac:chgData name="심 재철" userId="3a7cd7161df145aa" providerId="LiveId" clId="{9EDF1267-4813-4B5F-85AB-249D276E7A6A}" dt="2023-02-16T06:30:26.968" v="173" actId="208"/>
-          <ac:spMkLst>
-            <pc:docMk/>
-            <pc:sldMk cId="3425561884" sldId="263"/>
-            <ac:spMk id="43" creationId="{5382E435-CE38-4776-BF83-712CE4C128C4}"/>
-          </ac:spMkLst>
-        </pc:spChg>
-        <pc:spChg chg="add del">
-          <ac:chgData name="심 재철" userId="3a7cd7161df145aa" providerId="LiveId" clId="{9EDF1267-4813-4B5F-85AB-249D276E7A6A}" dt="2023-02-16T06:23:54.948" v="86" actId="478"/>
-          <ac:spMkLst>
-            <pc:docMk/>
-            <pc:sldMk cId="3425561884" sldId="263"/>
-            <ac:spMk id="46" creationId="{DF6B49FF-FF78-41AC-B6FB-68D497ED0371}"/>
-          </ac:spMkLst>
-        </pc:spChg>
-        <pc:picChg chg="add mod">
-          <ac:chgData name="심 재철" userId="3a7cd7161df145aa" providerId="LiveId" clId="{9EDF1267-4813-4B5F-85AB-249D276E7A6A}" dt="2023-02-20T02:08:59.951" v="252"/>
-          <ac:picMkLst>
-            <pc:docMk/>
-            <pc:sldMk cId="3425561884" sldId="263"/>
-            <ac:picMk id="2" creationId="{258643A5-7971-6C5E-48A6-EB99A1044225}"/>
-          </ac:picMkLst>
-        </pc:picChg>
-        <pc:picChg chg="add del mod">
-          <ac:chgData name="심 재철" userId="3a7cd7161df145aa" providerId="LiveId" clId="{9EDF1267-4813-4B5F-85AB-249D276E7A6A}" dt="2023-02-16T06:23:34.396" v="82"/>
-          <ac:picMkLst>
-            <pc:docMk/>
-            <pc:sldMk cId="3425561884" sldId="263"/>
-            <ac:picMk id="8" creationId="{ADB5C93E-A8D0-B00B-72CB-B75B6C6CB989}"/>
-          </ac:picMkLst>
-        </pc:picChg>
-        <pc:picChg chg="add del mod">
-          <ac:chgData name="심 재철" userId="3a7cd7161df145aa" providerId="LiveId" clId="{9EDF1267-4813-4B5F-85AB-249D276E7A6A}" dt="2023-02-16T06:23:47.834" v="85"/>
-          <ac:picMkLst>
-            <pc:docMk/>
-            <pc:sldMk cId="3425561884" sldId="263"/>
-            <ac:picMk id="15" creationId="{D6908176-636E-6E4A-6C7A-448220F5029B}"/>
-          </ac:picMkLst>
-        </pc:picChg>
-        <pc:picChg chg="add del mod">
-          <ac:chgData name="심 재철" userId="3a7cd7161df145aa" providerId="LiveId" clId="{9EDF1267-4813-4B5F-85AB-249D276E7A6A}" dt="2023-02-16T06:32:18.838" v="225" actId="478"/>
-          <ac:picMkLst>
-            <pc:docMk/>
-            <pc:sldMk cId="3425561884" sldId="263"/>
-            <ac:picMk id="21" creationId="{F911F7DE-254E-173E-748B-CFE18068AFC6}"/>
-          </ac:picMkLst>
-        </pc:picChg>
-        <pc:picChg chg="add del mod">
-          <ac:chgData name="심 재철" userId="3a7cd7161df145aa" providerId="LiveId" clId="{9EDF1267-4813-4B5F-85AB-249D276E7A6A}" dt="2023-02-20T02:08:59.143" v="251" actId="478"/>
-          <ac:picMkLst>
-            <pc:docMk/>
-            <pc:sldMk cId="3425561884" sldId="263"/>
-            <ac:picMk id="22" creationId="{B9F87CF1-DA5D-3F41-CB86-65AFB812DC8E}"/>
-          </ac:picMkLst>
-        </pc:picChg>
-        <pc:picChg chg="add del">
-          <ac:chgData name="심 재철" userId="3a7cd7161df145aa" providerId="LiveId" clId="{9EDF1267-4813-4B5F-85AB-249D276E7A6A}" dt="2023-02-16T06:24:11.404" v="93" actId="478"/>
-          <ac:picMkLst>
-            <pc:docMk/>
-            <pc:sldMk cId="3425561884" sldId="263"/>
-            <ac:picMk id="38" creationId="{763C0D49-1947-46CA-A55D-4775170A1F35}"/>
-          </ac:picMkLst>
-        </pc:picChg>
-      </pc:sldChg>
-      <pc:sldChg chg="addSp delSp modSp mod">
-        <pc:chgData name="심 재철" userId="3a7cd7161df145aa" providerId="LiveId" clId="{9EDF1267-4813-4B5F-85AB-249D276E7A6A}" dt="2023-02-20T02:09:03.004" v="254"/>
-        <pc:sldMkLst>
-          <pc:docMk/>
-          <pc:sldMk cId="2519270469" sldId="264"/>
-        </pc:sldMkLst>
-        <pc:spChg chg="add mod">
-          <ac:chgData name="심 재철" userId="3a7cd7161df145aa" providerId="LiveId" clId="{9EDF1267-4813-4B5F-85AB-249D276E7A6A}" dt="2023-02-16T06:24:20.071" v="98"/>
-          <ac:spMkLst>
-            <pc:docMk/>
-            <pc:sldMk cId="2519270469" sldId="264"/>
-            <ac:spMk id="2" creationId="{F1FAABE7-2C60-A00B-6F10-54B470967CD9}"/>
-          </ac:spMkLst>
-        </pc:spChg>
-        <pc:spChg chg="add mod">
-          <ac:chgData name="심 재철" userId="3a7cd7161df145aa" providerId="LiveId" clId="{9EDF1267-4813-4B5F-85AB-249D276E7A6A}" dt="2023-02-16T06:24:20.071" v="98"/>
-          <ac:spMkLst>
-            <pc:docMk/>
-            <pc:sldMk cId="2519270469" sldId="264"/>
-            <ac:spMk id="3" creationId="{DEB506EA-FBEB-809F-FD31-CADC8EBD0EB6}"/>
-          </ac:spMkLst>
-        </pc:spChg>
-        <pc:spChg chg="add mod">
-          <ac:chgData name="심 재철" userId="3a7cd7161df145aa" providerId="LiveId" clId="{9EDF1267-4813-4B5F-85AB-249D276E7A6A}" dt="2023-02-16T06:24:20.071" v="98"/>
-          <ac:spMkLst>
-            <pc:docMk/>
-            <pc:sldMk cId="2519270469" sldId="264"/>
-            <ac:spMk id="4" creationId="{42AD655C-DF49-FE69-F474-F1BB2474D335}"/>
-          </ac:spMkLst>
-        </pc:spChg>
-        <pc:spChg chg="add mod">
-          <ac:chgData name="심 재철" userId="3a7cd7161df145aa" providerId="LiveId" clId="{9EDF1267-4813-4B5F-85AB-249D276E7A6A}" dt="2023-02-16T06:24:20.071" v="98"/>
-          <ac:spMkLst>
-            <pc:docMk/>
-            <pc:sldMk cId="2519270469" sldId="264"/>
-            <ac:spMk id="8" creationId="{AA9D4380-35AA-6B64-DF97-37A7E94C203F}"/>
-          </ac:spMkLst>
-        </pc:spChg>
-        <pc:spChg chg="add mod">
-          <ac:chgData name="심 재철" userId="3a7cd7161df145aa" providerId="LiveId" clId="{9EDF1267-4813-4B5F-85AB-249D276E7A6A}" dt="2023-02-16T06:24:20.071" v="98"/>
-          <ac:spMkLst>
-            <pc:docMk/>
-            <pc:sldMk cId="2519270469" sldId="264"/>
-            <ac:spMk id="10" creationId="{E2894054-2107-14C8-34A6-2CB48753E96F}"/>
-          </ac:spMkLst>
-        </pc:spChg>
-        <pc:spChg chg="del">
-          <ac:chgData name="심 재철" userId="3a7cd7161df145aa" providerId="LiveId" clId="{9EDF1267-4813-4B5F-85AB-249D276E7A6A}" dt="2023-02-16T06:24:19.487" v="97" actId="478"/>
-          <ac:spMkLst>
-            <pc:docMk/>
-            <pc:sldMk cId="2519270469" sldId="264"/>
-            <ac:spMk id="33" creationId="{EF950688-7B8C-4425-802E-F4115D99CBDD}"/>
-          </ac:spMkLst>
-        </pc:spChg>
-        <pc:spChg chg="del">
-          <ac:chgData name="심 재철" userId="3a7cd7161df145aa" providerId="LiveId" clId="{9EDF1267-4813-4B5F-85AB-249D276E7A6A}" dt="2023-02-16T06:24:19.487" v="97" actId="478"/>
-          <ac:spMkLst>
-            <pc:docMk/>
-            <pc:sldMk cId="2519270469" sldId="264"/>
-            <ac:spMk id="34" creationId="{6A1B3B77-8A2A-48D4-907D-968DC4061113}"/>
-          </ac:spMkLst>
-        </pc:spChg>
-        <pc:spChg chg="del">
-          <ac:chgData name="심 재철" userId="3a7cd7161df145aa" providerId="LiveId" clId="{9EDF1267-4813-4B5F-85AB-249D276E7A6A}" dt="2023-02-16T06:24:19.487" v="97" actId="478"/>
-          <ac:spMkLst>
-            <pc:docMk/>
-            <pc:sldMk cId="2519270469" sldId="264"/>
-            <ac:spMk id="35" creationId="{F3B00E7D-C840-49B7-9CCE-2F524EA87B15}"/>
-          </ac:spMkLst>
-        </pc:spChg>
-        <pc:spChg chg="del">
-          <ac:chgData name="심 재철" userId="3a7cd7161df145aa" providerId="LiveId" clId="{9EDF1267-4813-4B5F-85AB-249D276E7A6A}" dt="2023-02-16T06:24:19.487" v="97" actId="478"/>
-          <ac:spMkLst>
-            <pc:docMk/>
-            <pc:sldMk cId="2519270469" sldId="264"/>
-            <ac:spMk id="36" creationId="{3CF18F20-DC0F-4880-B660-68BACC86F2F2}"/>
-          </ac:spMkLst>
-        </pc:spChg>
-        <pc:spChg chg="del">
-          <ac:chgData name="심 재철" userId="3a7cd7161df145aa" providerId="LiveId" clId="{9EDF1267-4813-4B5F-85AB-249D276E7A6A}" dt="2023-02-16T06:24:19.487" v="97" actId="478"/>
-          <ac:spMkLst>
-            <pc:docMk/>
-            <pc:sldMk cId="2519270469" sldId="264"/>
-            <ac:spMk id="37" creationId="{355D8FC0-D3C6-408A-88F0-B2F3F5993BDD}"/>
-          </ac:spMkLst>
-        </pc:spChg>
-        <pc:spChg chg="mod">
-          <ac:chgData name="심 재철" userId="3a7cd7161df145aa" providerId="LiveId" clId="{9EDF1267-4813-4B5F-85AB-249D276E7A6A}" dt="2023-02-16T06:30:57.379" v="180" actId="207"/>
-          <ac:spMkLst>
-            <pc:docMk/>
-            <pc:sldMk cId="2519270469" sldId="264"/>
-            <ac:spMk id="49" creationId="{6EC0A27F-CA5A-4A5B-ACA2-0870FC94E60A}"/>
-          </ac:spMkLst>
-        </pc:spChg>
-        <pc:spChg chg="del mod">
-          <ac:chgData name="심 재철" userId="3a7cd7161df145aa" providerId="LiveId" clId="{9EDF1267-4813-4B5F-85AB-249D276E7A6A}" dt="2023-02-16T06:24:19.487" v="97" actId="478"/>
-          <ac:spMkLst>
-            <pc:docMk/>
-            <pc:sldMk cId="2519270469" sldId="264"/>
-            <ac:spMk id="52" creationId="{3C2B3916-D238-48BD-B84E-751B4B99C88E}"/>
-          </ac:spMkLst>
-        </pc:spChg>
-        <pc:picChg chg="add mod">
-          <ac:chgData name="심 재철" userId="3a7cd7161df145aa" providerId="LiveId" clId="{9EDF1267-4813-4B5F-85AB-249D276E7A6A}" dt="2023-02-20T02:09:03.004" v="254"/>
-          <ac:picMkLst>
-            <pc:docMk/>
-            <pc:sldMk cId="2519270469" sldId="264"/>
-            <ac:picMk id="11" creationId="{055E0C1A-405A-B709-38CD-DA059AED4B29}"/>
-          </ac:picMkLst>
-        </pc:picChg>
-        <pc:picChg chg="add del mod">
-          <ac:chgData name="심 재철" userId="3a7cd7161df145aa" providerId="LiveId" clId="{9EDF1267-4813-4B5F-85AB-249D276E7A6A}" dt="2023-02-16T06:32:21.574" v="227" actId="478"/>
-          <ac:picMkLst>
-            <pc:docMk/>
-            <pc:sldMk cId="2519270469" sldId="264"/>
-            <ac:picMk id="11" creationId="{CB141BAD-9237-FE63-40BA-C999C4FDBCAE}"/>
-          </ac:picMkLst>
-        </pc:picChg>
-        <pc:picChg chg="add del">
-          <ac:chgData name="심 재철" userId="3a7cd7161df145aa" providerId="LiveId" clId="{9EDF1267-4813-4B5F-85AB-249D276E7A6A}" dt="2023-02-16T06:25:34.410" v="103"/>
-          <ac:picMkLst>
-            <pc:docMk/>
-            <pc:sldMk cId="2519270469" sldId="264"/>
-            <ac:picMk id="12" creationId="{D9A2E2A7-E984-306A-2307-5AA0EAB249A5}"/>
-          </ac:picMkLst>
-        </pc:picChg>
-        <pc:picChg chg="add mod">
-          <ac:chgData name="심 재철" userId="3a7cd7161df145aa" providerId="LiveId" clId="{9EDF1267-4813-4B5F-85AB-249D276E7A6A}" dt="2023-02-16T06:29:10.190" v="160" actId="1038"/>
-          <ac:picMkLst>
-            <pc:docMk/>
-            <pc:sldMk cId="2519270469" sldId="264"/>
-            <ac:picMk id="14" creationId="{C7BE9F3A-045E-1CEC-B09A-4D5AF445D361}"/>
-          </ac:picMkLst>
-        </pc:picChg>
-        <pc:picChg chg="add mod">
-          <ac:chgData name="심 재철" userId="3a7cd7161df145aa" providerId="LiveId" clId="{9EDF1267-4813-4B5F-85AB-249D276E7A6A}" dt="2023-02-16T06:28:51.604" v="144" actId="1038"/>
-          <ac:picMkLst>
-            <pc:docMk/>
-            <pc:sldMk cId="2519270469" sldId="264"/>
-            <ac:picMk id="16" creationId="{BEC8CF0C-9504-BDFF-2410-266552E96D67}"/>
-          </ac:picMkLst>
-        </pc:picChg>
-        <pc:picChg chg="add del mod">
-          <ac:chgData name="심 재철" userId="3a7cd7161df145aa" providerId="LiveId" clId="{9EDF1267-4813-4B5F-85AB-249D276E7A6A}" dt="2023-02-16T06:28:53.502" v="145" actId="478"/>
-          <ac:picMkLst>
-            <pc:docMk/>
-            <pc:sldMk cId="2519270469" sldId="264"/>
-            <ac:picMk id="17" creationId="{EAB57593-77E7-7672-CD73-F9CB8793C7D0}"/>
-          </ac:picMkLst>
-        </pc:picChg>
-        <pc:picChg chg="add del mod">
-          <ac:chgData name="심 재철" userId="3a7cd7161df145aa" providerId="LiveId" clId="{9EDF1267-4813-4B5F-85AB-249D276E7A6A}" dt="2023-02-16T06:29:11.993" v="161" actId="478"/>
-          <ac:picMkLst>
-            <pc:docMk/>
-            <pc:sldMk cId="2519270469" sldId="264"/>
-            <ac:picMk id="18" creationId="{FB745A39-318A-33AA-B8C9-6B6FAE906298}"/>
-          </ac:picMkLst>
-        </pc:picChg>
-        <pc:picChg chg="add del mod">
-          <ac:chgData name="심 재철" userId="3a7cd7161df145aa" providerId="LiveId" clId="{9EDF1267-4813-4B5F-85AB-249D276E7A6A}" dt="2023-02-20T02:09:02.233" v="253" actId="478"/>
-          <ac:picMkLst>
-            <pc:docMk/>
-            <pc:sldMk cId="2519270469" sldId="264"/>
-            <ac:picMk id="19" creationId="{3F20089A-258A-8A14-A8AA-4610E70AE2E9}"/>
-          </ac:picMkLst>
-        </pc:picChg>
-        <pc:picChg chg="del">
-          <ac:chgData name="심 재철" userId="3a7cd7161df145aa" providerId="LiveId" clId="{9EDF1267-4813-4B5F-85AB-249D276E7A6A}" dt="2023-02-16T06:24:19.487" v="97" actId="478"/>
-          <ac:picMkLst>
-            <pc:docMk/>
-            <pc:sldMk cId="2519270469" sldId="264"/>
-            <ac:picMk id="38" creationId="{763C0D49-1947-46CA-A55D-4775170A1F35}"/>
-          </ac:picMkLst>
-        </pc:picChg>
-        <pc:picChg chg="del mod">
-          <ac:chgData name="심 재철" userId="3a7cd7161df145aa" providerId="LiveId" clId="{9EDF1267-4813-4B5F-85AB-249D276E7A6A}" dt="2023-02-16T06:27:00.670" v="104" actId="478"/>
-          <ac:picMkLst>
-            <pc:docMk/>
-            <pc:sldMk cId="2519270469" sldId="264"/>
-            <ac:picMk id="3074" creationId="{E0902EBD-9BC1-4D3C-9632-96B3AA940545}"/>
-          </ac:picMkLst>
-        </pc:picChg>
-        <pc:picChg chg="del">
-          <ac:chgData name="심 재철" userId="3a7cd7161df145aa" providerId="LiveId" clId="{9EDF1267-4813-4B5F-85AB-249D276E7A6A}" dt="2023-02-16T06:27:06.548" v="106" actId="478"/>
-          <ac:picMkLst>
-            <pc:docMk/>
-            <pc:sldMk cId="2519270469" sldId="264"/>
-            <ac:picMk id="3076" creationId="{26980769-4312-4A70-A2BC-6C41CF9C1530}"/>
-          </ac:picMkLst>
-        </pc:picChg>
-      </pc:sldChg>
-      <pc:sldChg chg="addSp delSp modSp mod">
-        <pc:chgData name="심 재철" userId="3a7cd7161df145aa" providerId="LiveId" clId="{9EDF1267-4813-4B5F-85AB-249D276E7A6A}" dt="2023-02-20T02:09:07.174" v="256"/>
-        <pc:sldMkLst>
-          <pc:docMk/>
-          <pc:sldMk cId="2824343878" sldId="265"/>
-        </pc:sldMkLst>
-        <pc:spChg chg="add mod">
-          <ac:chgData name="심 재철" userId="3a7cd7161df145aa" providerId="LiveId" clId="{9EDF1267-4813-4B5F-85AB-249D276E7A6A}" dt="2023-02-16T06:24:33.341" v="100"/>
-          <ac:spMkLst>
-            <pc:docMk/>
-            <pc:sldMk cId="2824343878" sldId="265"/>
-            <ac:spMk id="2" creationId="{1335F47C-31A7-F156-947D-5BE41FAE9589}"/>
-          </ac:spMkLst>
-        </pc:spChg>
-        <pc:spChg chg="add mod">
-          <ac:chgData name="심 재철" userId="3a7cd7161df145aa" providerId="LiveId" clId="{9EDF1267-4813-4B5F-85AB-249D276E7A6A}" dt="2023-02-16T06:24:33.341" v="100"/>
-          <ac:spMkLst>
-            <pc:docMk/>
-            <pc:sldMk cId="2824343878" sldId="265"/>
-            <ac:spMk id="3" creationId="{269DEA00-7683-3BDD-90C2-8A8D33B0BBA0}"/>
-          </ac:spMkLst>
-        </pc:spChg>
-        <pc:spChg chg="add mod">
-          <ac:chgData name="심 재철" userId="3a7cd7161df145aa" providerId="LiveId" clId="{9EDF1267-4813-4B5F-85AB-249D276E7A6A}" dt="2023-02-16T06:24:33.341" v="100"/>
-          <ac:spMkLst>
-            <pc:docMk/>
-            <pc:sldMk cId="2824343878" sldId="265"/>
-            <ac:spMk id="4" creationId="{67E591E8-059A-B303-8B7D-80FCA3467E8F}"/>
-          </ac:spMkLst>
-        </pc:spChg>
-        <pc:spChg chg="add mod">
-          <ac:chgData name="심 재철" userId="3a7cd7161df145aa" providerId="LiveId" clId="{9EDF1267-4813-4B5F-85AB-249D276E7A6A}" dt="2023-02-16T06:24:33.341" v="100"/>
-          <ac:spMkLst>
-            <pc:docMk/>
-            <pc:sldMk cId="2824343878" sldId="265"/>
-            <ac:spMk id="5" creationId="{0198F96A-C8CF-F45A-2BFA-5D2DA3DE1A03}"/>
-          </ac:spMkLst>
-        </pc:spChg>
-        <pc:spChg chg="add mod">
-          <ac:chgData name="심 재철" userId="3a7cd7161df145aa" providerId="LiveId" clId="{9EDF1267-4813-4B5F-85AB-249D276E7A6A}" dt="2023-02-16T06:24:33.341" v="100"/>
-          <ac:spMkLst>
-            <pc:docMk/>
-            <pc:sldMk cId="2824343878" sldId="265"/>
-            <ac:spMk id="6" creationId="{CA27636F-8C7B-2607-6E86-C3F693452DB2}"/>
-          </ac:spMkLst>
-        </pc:spChg>
-        <pc:spChg chg="del">
-          <ac:chgData name="심 재철" userId="3a7cd7161df145aa" providerId="LiveId" clId="{9EDF1267-4813-4B5F-85AB-249D276E7A6A}" dt="2023-02-16T06:24:32.557" v="99" actId="478"/>
-          <ac:spMkLst>
-            <pc:docMk/>
-            <pc:sldMk cId="2824343878" sldId="265"/>
-            <ac:spMk id="33" creationId="{EF950688-7B8C-4425-802E-F4115D99CBDD}"/>
-          </ac:spMkLst>
-        </pc:spChg>
-        <pc:spChg chg="del">
-          <ac:chgData name="심 재철" userId="3a7cd7161df145aa" providerId="LiveId" clId="{9EDF1267-4813-4B5F-85AB-249D276E7A6A}" dt="2023-02-16T06:24:32.557" v="99" actId="478"/>
-          <ac:spMkLst>
-            <pc:docMk/>
-            <pc:sldMk cId="2824343878" sldId="265"/>
-            <ac:spMk id="34" creationId="{6A1B3B77-8A2A-48D4-907D-968DC4061113}"/>
-          </ac:spMkLst>
-        </pc:spChg>
-        <pc:spChg chg="del">
-          <ac:chgData name="심 재철" userId="3a7cd7161df145aa" providerId="LiveId" clId="{9EDF1267-4813-4B5F-85AB-249D276E7A6A}" dt="2023-02-16T06:24:32.557" v="99" actId="478"/>
-          <ac:spMkLst>
-            <pc:docMk/>
-            <pc:sldMk cId="2824343878" sldId="265"/>
-            <ac:spMk id="35" creationId="{F3B00E7D-C840-49B7-9CCE-2F524EA87B15}"/>
-          </ac:spMkLst>
-        </pc:spChg>
-        <pc:spChg chg="del">
-          <ac:chgData name="심 재철" userId="3a7cd7161df145aa" providerId="LiveId" clId="{9EDF1267-4813-4B5F-85AB-249D276E7A6A}" dt="2023-02-16T06:24:32.557" v="99" actId="478"/>
-          <ac:spMkLst>
-            <pc:docMk/>
-            <pc:sldMk cId="2824343878" sldId="265"/>
-            <ac:spMk id="36" creationId="{3CF18F20-DC0F-4880-B660-68BACC86F2F2}"/>
-          </ac:spMkLst>
-        </pc:spChg>
-        <pc:spChg chg="del">
-          <ac:chgData name="심 재철" userId="3a7cd7161df145aa" providerId="LiveId" clId="{9EDF1267-4813-4B5F-85AB-249D276E7A6A}" dt="2023-02-16T06:24:32.557" v="99" actId="478"/>
-          <ac:spMkLst>
-            <pc:docMk/>
-            <pc:sldMk cId="2824343878" sldId="265"/>
-            <ac:spMk id="37" creationId="{355D8FC0-D3C6-408A-88F0-B2F3F5993BDD}"/>
-          </ac:spMkLst>
-        </pc:spChg>
-        <pc:spChg chg="mod">
-          <ac:chgData name="심 재철" userId="3a7cd7161df145aa" providerId="LiveId" clId="{9EDF1267-4813-4B5F-85AB-249D276E7A6A}" dt="2023-02-16T06:31:07.073" v="182" actId="208"/>
-          <ac:spMkLst>
-            <pc:docMk/>
-            <pc:sldMk cId="2824343878" sldId="265"/>
-            <ac:spMk id="51" creationId="{A14A19AA-1AAE-493A-8556-D920BFCCF056}"/>
-          </ac:spMkLst>
-        </pc:spChg>
-        <pc:picChg chg="add mod">
-          <ac:chgData name="심 재철" userId="3a7cd7161df145aa" providerId="LiveId" clId="{9EDF1267-4813-4B5F-85AB-249D276E7A6A}" dt="2023-02-20T02:09:07.174" v="256"/>
-          <ac:picMkLst>
-            <pc:docMk/>
-            <pc:sldMk cId="2824343878" sldId="265"/>
-            <ac:picMk id="7" creationId="{550D0801-B108-61DC-75D3-9414DA708C1C}"/>
-          </ac:picMkLst>
-        </pc:picChg>
-        <pc:picChg chg="add del mod">
-          <ac:chgData name="심 재철" userId="3a7cd7161df145aa" providerId="LiveId" clId="{9EDF1267-4813-4B5F-85AB-249D276E7A6A}" dt="2023-02-16T06:32:26.444" v="229" actId="478"/>
-          <ac:picMkLst>
-            <pc:docMk/>
-            <pc:sldMk cId="2824343878" sldId="265"/>
-            <ac:picMk id="7" creationId="{F400EC8D-5BC1-D6B4-7C47-6F1B98601DF3}"/>
-          </ac:picMkLst>
-        </pc:picChg>
-        <pc:picChg chg="add del mod">
-          <ac:chgData name="심 재철" userId="3a7cd7161df145aa" providerId="LiveId" clId="{9EDF1267-4813-4B5F-85AB-249D276E7A6A}" dt="2023-02-20T02:09:06.340" v="255" actId="478"/>
-          <ac:picMkLst>
-            <pc:docMk/>
-            <pc:sldMk cId="2824343878" sldId="265"/>
-            <ac:picMk id="8" creationId="{ADAB354E-F595-85F9-7351-E3AB063263F8}"/>
-          </ac:picMkLst>
-        </pc:picChg>
-        <pc:picChg chg="del">
-          <ac:chgData name="심 재철" userId="3a7cd7161df145aa" providerId="LiveId" clId="{9EDF1267-4813-4B5F-85AB-249D276E7A6A}" dt="2023-02-16T06:24:32.557" v="99" actId="478"/>
-          <ac:picMkLst>
-            <pc:docMk/>
-            <pc:sldMk cId="2824343878" sldId="265"/>
-            <ac:picMk id="38" creationId="{763C0D49-1947-46CA-A55D-4775170A1F35}"/>
-          </ac:picMkLst>
-        </pc:picChg>
-      </pc:sldChg>
-      <pc:sldChg chg="addSp delSp modSp add mod">
-        <pc:chgData name="심 재철" userId="3a7cd7161df145aa" providerId="LiveId" clId="{9EDF1267-4813-4B5F-85AB-249D276E7A6A}" dt="2023-02-20T02:09:20.277" v="260"/>
-        <pc:sldMkLst>
-          <pc:docMk/>
-          <pc:sldMk cId="1960047138" sldId="266"/>
-        </pc:sldMkLst>
-        <pc:spChg chg="del topLvl">
-          <ac:chgData name="심 재철" userId="3a7cd7161df145aa" providerId="LiveId" clId="{9EDF1267-4813-4B5F-85AB-249D276E7A6A}" dt="2023-02-16T06:31:40.550" v="188" actId="478"/>
-          <ac:spMkLst>
-            <pc:docMk/>
-            <pc:sldMk cId="1960047138" sldId="266"/>
-            <ac:spMk id="59" creationId="{00000000-0000-0000-0000-000000000000}"/>
-          </ac:spMkLst>
-        </pc:spChg>
-        <pc:spChg chg="topLvl">
-          <ac:chgData name="심 재철" userId="3a7cd7161df145aa" providerId="LiveId" clId="{9EDF1267-4813-4B5F-85AB-249D276E7A6A}" dt="2023-02-16T06:31:40.550" v="188" actId="478"/>
-          <ac:spMkLst>
-            <pc:docMk/>
-            <pc:sldMk cId="1960047138" sldId="266"/>
-            <ac:spMk id="60" creationId="{00000000-0000-0000-0000-000000000000}"/>
-          </ac:spMkLst>
-        </pc:spChg>
-        <pc:spChg chg="mod">
-          <ac:chgData name="심 재철" userId="3a7cd7161df145aa" providerId="LiveId" clId="{9EDF1267-4813-4B5F-85AB-249D276E7A6A}" dt="2023-02-16T06:31:48.855" v="220" actId="20577"/>
-          <ac:spMkLst>
-            <pc:docMk/>
-            <pc:sldMk cId="1960047138" sldId="266"/>
-            <ac:spMk id="70" creationId="{00000000-0000-0000-0000-000000000000}"/>
-          </ac:spMkLst>
-        </pc:spChg>
-        <pc:grpChg chg="del">
-          <ac:chgData name="심 재철" userId="3a7cd7161df145aa" providerId="LiveId" clId="{9EDF1267-4813-4B5F-85AB-249D276E7A6A}" dt="2023-02-16T06:31:40.550" v="188" actId="478"/>
-          <ac:grpSpMkLst>
-            <pc:docMk/>
-            <pc:sldMk cId="1960047138" sldId="266"/>
-            <ac:grpSpMk id="58" creationId="{00000000-0000-0000-0000-000000000000}"/>
-          </ac:grpSpMkLst>
-        </pc:grpChg>
-        <pc:picChg chg="add del mod">
-          <ac:chgData name="심 재철" userId="3a7cd7161df145aa" providerId="LiveId" clId="{9EDF1267-4813-4B5F-85AB-249D276E7A6A}" dt="2023-02-20T02:09:15.503" v="257" actId="478"/>
-          <ac:picMkLst>
-            <pc:docMk/>
-            <pc:sldMk cId="1960047138" sldId="266"/>
-            <ac:picMk id="2" creationId="{3ECD3ECB-25BD-C25A-7BD1-FE6563AB1141}"/>
-          </ac:picMkLst>
-        </pc:picChg>
-        <pc:picChg chg="add del mod">
-          <ac:chgData name="심 재철" userId="3a7cd7161df145aa" providerId="LiveId" clId="{9EDF1267-4813-4B5F-85AB-249D276E7A6A}" dt="2023-02-20T02:09:17.702" v="259"/>
-          <ac:picMkLst>
-            <pc:docMk/>
-            <pc:sldMk cId="1960047138" sldId="266"/>
-            <ac:picMk id="3" creationId="{39F43298-0465-0EDE-2B8A-2E1FA54939F8}"/>
-          </ac:picMkLst>
-        </pc:picChg>
-        <pc:picChg chg="del">
-          <ac:chgData name="심 재철" userId="3a7cd7161df145aa" providerId="LiveId" clId="{9EDF1267-4813-4B5F-85AB-249D276E7A6A}" dt="2023-02-16T06:32:42.353" v="233" actId="478"/>
-          <ac:picMkLst>
-            <pc:docMk/>
-            <pc:sldMk cId="1960047138" sldId="266"/>
-            <ac:picMk id="4" creationId="{2CA03EE5-2825-9914-F8E7-E8E48D98B404}"/>
-          </ac:picMkLst>
-        </pc:picChg>
-        <pc:picChg chg="add mod">
-          <ac:chgData name="심 재철" userId="3a7cd7161df145aa" providerId="LiveId" clId="{9EDF1267-4813-4B5F-85AB-249D276E7A6A}" dt="2023-02-20T02:09:20.277" v="260"/>
-          <ac:picMkLst>
-            <pc:docMk/>
-            <pc:sldMk cId="1960047138" sldId="266"/>
-            <ac:picMk id="4" creationId="{3FA147BB-09D1-476A-1460-BF9997C128C1}"/>
-          </ac:picMkLst>
-        </pc:picChg>
-      </pc:sldChg>
-    </pc:docChg>
-  </pc:docChgLst>
-</pc:chgInfo>
 </file>
 
 <file path=ppt/notesMasters/notesMaster1.xml><?xml version="1.0" encoding="utf-8"?>
@@ -7475,120 +6438,108 @@
           <a:p>
             <a:pPr lvl="0"/>
             <a:r>
-              <a:rPr lang="ko-KR" sz="1200" dirty="0">
+              <a:rPr lang="en-US" altLang="ko-KR" sz="1200" dirty="0">
                 <a:solidFill>
                   <a:srgbClr val="3F3F3F"/>
                 </a:solidFill>
-                <a:latin typeface="+mn-ea"/>
-                <a:ea typeface="+mn-ea"/>
+                <a:latin typeface="맑은 고딕"/>
+                <a:ea typeface="맑은 고딕"/>
                 <a:cs typeface="Ultra"/>
                 <a:sym typeface="Ultra"/>
               </a:rPr>
-              <a:t>202</a:t>
-            </a:r>
-            <a:r>
-              <a:rPr lang="en-US" altLang="ko-KR" sz="1200" dirty="0">
+              <a:t>2022</a:t>
+            </a:r>
+            <a:r>
+              <a:rPr lang="ko-KR" sz="1200" dirty="0">
                 <a:solidFill>
                   <a:srgbClr val="3F3F3F"/>
                 </a:solidFill>
-                <a:latin typeface="+mn-ea"/>
-                <a:ea typeface="+mn-ea"/>
+                <a:latin typeface="맑은 고딕"/>
+                <a:ea typeface="맑은 고딕"/>
                 <a:cs typeface="Ultra"/>
                 <a:sym typeface="Ultra"/>
               </a:rPr>
-              <a:t>2</a:t>
-            </a:r>
-            <a:r>
-              <a:rPr lang="ko-KR" sz="1200" dirty="0">
+              <a:t>. 3~6 </a:t>
+            </a:r>
+            <a:r>
+              <a:rPr lang="ko-KR" altLang="en-US" sz="1200" dirty="0">
                 <a:solidFill>
                   <a:srgbClr val="3F3F3F"/>
                 </a:solidFill>
-                <a:latin typeface="+mn-ea"/>
-                <a:ea typeface="+mn-ea"/>
+                <a:latin typeface="맑은 고딕"/>
+                <a:ea typeface="맑은 고딕"/>
                 <a:cs typeface="Ultra"/>
                 <a:sym typeface="Ultra"/>
               </a:rPr>
-              <a:t>. 3~6 </a:t>
-            </a:r>
-            <a:r>
-              <a:rPr lang="ko-KR" altLang="en-US" sz="1200" dirty="0">
+              <a:t>지역별</a:t>
+            </a:r>
+            <a:r>
+              <a:rPr lang="en-US" altLang="ko-KR" sz="1200" dirty="0">
                 <a:solidFill>
                   <a:srgbClr val="3F3F3F"/>
                 </a:solidFill>
-                <a:latin typeface="+mn-ea"/>
-                <a:ea typeface="+mn-ea"/>
+                <a:latin typeface="맑은 고딕"/>
+                <a:ea typeface="맑은 고딕"/>
                 <a:cs typeface="Ultra"/>
                 <a:sym typeface="Ultra"/>
               </a:rPr>
-              <a:t>지역별</a:t>
-            </a:r>
-            <a:r>
-              <a:rPr lang="en-US" altLang="ko-KR" sz="1200" dirty="0">
+              <a:t>, </a:t>
+            </a:r>
+            <a:r>
+              <a:rPr lang="ko-KR" altLang="en-US" sz="1200" dirty="0">
                 <a:solidFill>
                   <a:srgbClr val="3F3F3F"/>
                 </a:solidFill>
-                <a:latin typeface="+mn-ea"/>
-                <a:ea typeface="+mn-ea"/>
+                <a:latin typeface="맑은 고딕"/>
+                <a:ea typeface="맑은 고딕"/>
                 <a:cs typeface="Ultra"/>
                 <a:sym typeface="Ultra"/>
               </a:rPr>
-              <a:t>, </a:t>
-            </a:r>
-            <a:r>
-              <a:rPr lang="ko-KR" altLang="en-US" sz="1200" dirty="0">
+              <a:t>학교별 멘토멘티 매칭 앱 </a:t>
+            </a:r>
+            <a:r>
+              <a:rPr lang="ko-KR" sz="1200" b="1" dirty="0">
                 <a:solidFill>
                   <a:srgbClr val="3F3F3F"/>
                 </a:solidFill>
-                <a:latin typeface="+mn-ea"/>
-                <a:ea typeface="+mn-ea"/>
+                <a:latin typeface="맑은 고딕"/>
+                <a:ea typeface="맑은 고딕"/>
                 <a:cs typeface="Ultra"/>
                 <a:sym typeface="Ultra"/>
               </a:rPr>
-              <a:t>학교별 멘토멘티 매칭 앱 </a:t>
-            </a:r>
-            <a:r>
-              <a:rPr lang="ko-KR" sz="1200" b="1" dirty="0">
+              <a:t>“</a:t>
+            </a:r>
+            <a:r>
+              <a:rPr lang="en-US" altLang="ko-KR" sz="1200" b="1" dirty="0">
                 <a:solidFill>
                   <a:srgbClr val="3F3F3F"/>
                 </a:solidFill>
-                <a:latin typeface="+mn-ea"/>
-                <a:ea typeface="+mn-ea"/>
+                <a:latin typeface="맑은 고딕"/>
+                <a:ea typeface="맑은 고딕"/>
                 <a:cs typeface="Ultra"/>
                 <a:sym typeface="Ultra"/>
               </a:rPr>
-              <a:t>“</a:t>
-            </a:r>
-            <a:r>
-              <a:rPr lang="en-US" altLang="ko-KR" sz="1200" b="1" dirty="0">
+              <a:t>PickMen</a:t>
+            </a:r>
+            <a:r>
+              <a:rPr lang="ko-KR" sz="1200" b="1" dirty="0">
                 <a:solidFill>
                   <a:srgbClr val="3F3F3F"/>
                 </a:solidFill>
-                <a:latin typeface="+mn-ea"/>
-                <a:ea typeface="+mn-ea"/>
+                <a:latin typeface="맑은 고딕"/>
+                <a:ea typeface="맑은 고딕"/>
                 <a:cs typeface="Ultra"/>
                 <a:sym typeface="Ultra"/>
               </a:rPr>
-              <a:t>PickMen</a:t>
-            </a:r>
-            <a:r>
-              <a:rPr lang="ko-KR" sz="1200" b="1" dirty="0">
+              <a:t>” </a:t>
+            </a:r>
+            <a:r>
+              <a:rPr lang="ko-KR" sz="1200" dirty="0">
                 <a:solidFill>
                   <a:srgbClr val="3F3F3F"/>
                 </a:solidFill>
-                <a:latin typeface="+mn-ea"/>
-                <a:ea typeface="+mn-ea"/>
-                <a:cs typeface="Ultra"/>
-                <a:sym typeface="Ultra"/>
-              </a:rPr>
-              <a:t>” </a:t>
-            </a:r>
-            <a:r>
-              <a:rPr lang="ko-KR" sz="1200" dirty="0">
-                <a:solidFill>
-                  <a:srgbClr val="3F3F3F"/>
-                </a:solidFill>
-                <a:latin typeface="+mn-ea"/>
-                <a:ea typeface="+mn-ea"/>
+                <a:latin typeface="맑은 고딕"/>
+                <a:ea typeface="맑은 고딕"/>
                 <a:cs typeface="Ultra"/>
                 <a:sym typeface="Ultra"/>
               </a:rPr>
@@ -7598,8 +6549,8 @@
               <a:solidFill>
                 <a:srgbClr val="3F3F3F"/>
               </a:solidFill>
-              <a:latin typeface="+mn-ea"/>
-              <a:ea typeface="+mn-ea"/>
+              <a:latin typeface="맑은 고딕"/>
+              <a:ea typeface="맑은 고딕"/>
               <a:cs typeface="Ultra"/>
               <a:sym typeface="Ultra"/>
             </a:endParaRPr>
@@ -7607,87 +6558,99 @@
           <a:p>
             <a:pPr lvl="0"/>
             <a:r>
-              <a:rPr lang="ko-KR" sz="1200" dirty="0">
+              <a:rPr lang="en-US" altLang="ko-KR" sz="1200" dirty="0">
                 <a:solidFill>
                   <a:srgbClr val="3F3F3F"/>
                 </a:solidFill>
-                <a:latin typeface="+mn-ea"/>
-                <a:ea typeface="+mn-ea"/>
+                <a:latin typeface="맑은 고딕"/>
+                <a:ea typeface="맑은 고딕"/>
                 <a:cs typeface="Ultra"/>
                 <a:sym typeface="Ultra"/>
               </a:rPr>
-              <a:t>2021. </a:t>
-            </a:r>
-            <a:r>
-              <a:rPr lang="en-US" altLang="ko-KR" sz="1200" dirty="0">
+              <a:t>2022</a:t>
+            </a:r>
+            <a:r>
+              <a:rPr lang="ko-KR" sz="1200" dirty="0">
                 <a:solidFill>
                   <a:srgbClr val="3F3F3F"/>
                 </a:solidFill>
-                <a:latin typeface="+mn-ea"/>
-                <a:ea typeface="+mn-ea"/>
+                <a:latin typeface="맑은 고딕"/>
+                <a:ea typeface="맑은 고딕"/>
                 <a:cs typeface="Ultra"/>
                 <a:sym typeface="Ultra"/>
               </a:rPr>
-              <a:t>9</a:t>
-            </a:r>
-            <a:r>
-              <a:rPr lang="ko-KR" sz="1200" dirty="0">
+              <a:t>. </a:t>
+            </a:r>
+            <a:r>
+              <a:rPr lang="en-US" altLang="ko-KR" sz="1200" dirty="0">
                 <a:solidFill>
                   <a:srgbClr val="3F3F3F"/>
                 </a:solidFill>
-                <a:latin typeface="+mn-ea"/>
-                <a:ea typeface="+mn-ea"/>
+                <a:latin typeface="맑은 고딕"/>
+                <a:ea typeface="맑은 고딕"/>
                 <a:cs typeface="Ultra"/>
                 <a:sym typeface="Ultra"/>
               </a:rPr>
-              <a:t>~12 </a:t>
-            </a:r>
-            <a:r>
-              <a:rPr lang="ko-KR" altLang="en-US" sz="1200" dirty="0">
+              <a:t>9</a:t>
+            </a:r>
+            <a:r>
+              <a:rPr lang="ko-KR" sz="1200" dirty="0">
                 <a:solidFill>
                   <a:srgbClr val="3F3F3F"/>
                 </a:solidFill>
-                <a:latin typeface="+mn-ea"/>
-                <a:ea typeface="+mn-ea"/>
+                <a:latin typeface="맑은 고딕"/>
+                <a:ea typeface="맑은 고딕"/>
                 <a:cs typeface="Ultra"/>
                 <a:sym typeface="Ultra"/>
               </a:rPr>
-              <a:t>학우들 간의 배달 앱 </a:t>
-            </a:r>
-            <a:r>
-              <a:rPr lang="ko-KR" sz="1200" b="1" dirty="0">
+              <a:t>~12 </a:t>
+            </a:r>
+            <a:r>
+              <a:rPr lang="ko-KR" altLang="en-US" sz="1200" dirty="0">
                 <a:solidFill>
                   <a:srgbClr val="3F3F3F"/>
                 </a:solidFill>
-                <a:latin typeface="+mn-ea"/>
-                <a:ea typeface="+mn-ea"/>
+                <a:latin typeface="맑은 고딕"/>
+                <a:ea typeface="맑은 고딕"/>
                 <a:cs typeface="Ultra"/>
                 <a:sym typeface="Ultra"/>
               </a:rPr>
-              <a:t>“</a:t>
-            </a:r>
-            <a:r>
-              <a:rPr lang="ko-KR" altLang="en-US" sz="1200" b="1" dirty="0">
+              <a:t>학우들 간의 배달 앱 </a:t>
+            </a:r>
+            <a:r>
+              <a:rPr lang="ko-KR" sz="1200" b="1" dirty="0">
                 <a:solidFill>
                   <a:srgbClr val="3F3F3F"/>
                 </a:solidFill>
-                <a:latin typeface="+mn-ea"/>
-                <a:ea typeface="+mn-ea"/>
+                <a:latin typeface="맑은 고딕"/>
+                <a:ea typeface="맑은 고딕"/>
                 <a:cs typeface="Ultra"/>
                 <a:sym typeface="Ultra"/>
               </a:rPr>
-              <a:t>학우야 배달 해줘</a:t>
-            </a:r>
-            <a:r>
-              <a:rPr lang="ko-KR" sz="1200" b="1" dirty="0">
+              <a:t>“</a:t>
+            </a:r>
+            <a:r>
+              <a:rPr lang="ko-KR" altLang="en-US" sz="1200" b="1" dirty="0">
                 <a:solidFill>
                   <a:srgbClr val="3F3F3F"/>
                 </a:solidFill>
-                <a:latin typeface="+mn-ea"/>
-                <a:ea typeface="+mn-ea"/>
+                <a:latin typeface="맑은 고딕"/>
+                <a:ea typeface="맑은 고딕"/>
                 <a:cs typeface="Ultra"/>
                 <a:sym typeface="Ultra"/>
               </a:rPr>
+              <a:t>학우야 배달 해줘</a:t>
+            </a:r>
+            <a:r>
+              <a:rPr lang="ko-KR" sz="1200" b="1" dirty="0">
+                <a:solidFill>
+                  <a:srgbClr val="3F3F3F"/>
+                </a:solidFill>
+                <a:latin typeface="맑은 고딕"/>
+                <a:ea typeface="맑은 고딕"/>
+                <a:cs typeface="Ultra"/>
+                <a:sym typeface="Ultra"/>
+              </a:rPr>
               <a:t>“ </a:t>
             </a:r>
             <a:r>
@@ -7695,8 +6658,8 @@
                 <a:solidFill>
                   <a:srgbClr val="3F3F3F"/>
                 </a:solidFill>
-                <a:latin typeface="+mn-ea"/>
-                <a:ea typeface="+mn-ea"/>
+                <a:latin typeface="맑은 고딕"/>
+                <a:ea typeface="맑은 고딕"/>
                 <a:cs typeface="Ultra"/>
                 <a:sym typeface="Ultra"/>
               </a:rPr>
@@ -7706,8 +6669,8 @@
               <a:solidFill>
                 <a:srgbClr val="3F3F3F"/>
               </a:solidFill>
-              <a:latin typeface="+mn-ea"/>
-              <a:ea typeface="+mn-ea"/>
+              <a:latin typeface="맑은 고딕"/>
+              <a:ea typeface="맑은 고딕"/>
               <a:cs typeface="Ultra"/>
               <a:sym typeface="Ultra"/>
             </a:endParaRPr>
@@ -7819,7 +6782,7 @@
         <p:spPr>
           <a:xfrm>
             <a:off x="534026" y="1595021"/>
-            <a:ext cx="2318303" cy="253875"/>
+            <a:ext cx="2318303" cy="415458"/>
           </a:xfrm>
           <a:prstGeom prst="rect">
             <a:avLst/>
@@ -7834,6 +6797,38 @@
             <a:spAutoFit/>
           </a:bodyPr>
           <a:lstStyle/>
+          <a:p>
+            <a:pPr marL="0" marR="0" lvl="0" indent="0" algn="l" rtl="0">
+              <a:spcBef>
+                <a:spcPts val="0"/>
+              </a:spcBef>
+              <a:spcAft>
+                <a:spcPts val="0"/>
+              </a:spcAft>
+              <a:buNone/>
+            </a:pPr>
+            <a:r>
+              <a:rPr lang="ko-KR" altLang="en-US" sz="1050" dirty="0">
+                <a:solidFill>
+                  <a:srgbClr val="3F3F3F"/>
+                </a:solidFill>
+                <a:latin typeface="+mn-ea"/>
+                <a:ea typeface="+mn-ea"/>
+                <a:cs typeface="Ultra"/>
+                <a:sym typeface="Ultra"/>
+              </a:rPr>
+              <a:t>백엔드 개발</a:t>
+            </a:r>
+            <a:endParaRPr lang="en-US" altLang="ko-KR" sz="1050" dirty="0">
+              <a:solidFill>
+                <a:srgbClr val="3F3F3F"/>
+              </a:solidFill>
+              <a:latin typeface="+mn-ea"/>
+              <a:ea typeface="+mn-ea"/>
+              <a:cs typeface="Ultra"/>
+              <a:sym typeface="Ultra"/>
+            </a:endParaRPr>
+          </a:p>
           <a:p>
             <a:pPr marL="0" marR="0" lvl="0" indent="0" algn="l" rtl="0">
               <a:spcBef>
@@ -8546,7 +7541,7 @@
         </p:nvSpPr>
         <p:spPr>
           <a:xfrm>
-            <a:off x="528390" y="1826184"/>
+            <a:off x="528390" y="1938728"/>
             <a:ext cx="2512700" cy="253916"/>
           </a:xfrm>
           <a:prstGeom prst="rect">
@@ -9517,6 +8512,60 @@
       </p:sp>
       <p:sp>
         <p:nvSpPr>
+          <p:cNvPr id="11" name="Google Shape;88;p2">
+            <a:extLst>
+              <a:ext uri="{FF2B5EF4-FFF2-40B4-BE49-F238E27FC236}">
+                <a16:creationId xmlns:a16="http://schemas.microsoft.com/office/drawing/2014/main" id="{DBAA6997-F6CF-2025-22E5-6082CC54B618}"/>
+              </a:ext>
+            </a:extLst>
+          </p:cNvPr>
+          <p:cNvSpPr/>
+          <p:nvPr/>
+        </p:nvSpPr>
+        <p:spPr>
+          <a:xfrm>
+            <a:off x="493059" y="1570353"/>
+            <a:ext cx="2318303" cy="667578"/>
+          </a:xfrm>
+          <a:prstGeom prst="rect">
+            <a:avLst/>
+          </a:prstGeom>
+          <a:solidFill>
+            <a:schemeClr val="lt1"/>
+          </a:solidFill>
+          <a:ln>
+            <a:noFill/>
+          </a:ln>
+        </p:spPr>
+        <p:txBody>
+          <a:bodyPr spcFirstLastPara="1" wrap="square" lIns="91425" tIns="45700" rIns="91425" bIns="45700" anchor="ctr" anchorCtr="0">
+            <a:noAutofit/>
+          </a:bodyPr>
+          <a:lstStyle/>
+          <a:p>
+            <a:pPr marL="0" marR="0" lvl="0" indent="0" algn="ctr" rtl="0">
+              <a:spcBef>
+                <a:spcPts val="0"/>
+              </a:spcBef>
+              <a:spcAft>
+                <a:spcPts val="0"/>
+              </a:spcAft>
+              <a:buNone/>
+            </a:pPr>
+            <a:endParaRPr sz="1800" dirty="0">
+              <a:solidFill>
+                <a:schemeClr val="lt1"/>
+              </a:solidFill>
+              <a:latin typeface="+mn-ea"/>
+              <a:ea typeface="+mn-ea"/>
+              <a:cs typeface="Malgun Gothic"/>
+              <a:sym typeface="Malgun Gothic"/>
+            </a:endParaRPr>
+          </a:p>
+        </p:txBody>
+      </p:sp>
+      <p:sp>
+        <p:nvSpPr>
           <p:cNvPr id="12" name="Google Shape;89;p2">
             <a:extLst>
               <a:ext uri="{FF2B5EF4-FFF2-40B4-BE49-F238E27FC236}">
@@ -9681,159 +8730,7 @@
         </p:nvSpPr>
         <p:spPr>
           <a:xfrm>
-            <a:off x="519018" y="1948140"/>
-            <a:ext cx="2512700" cy="253916"/>
-          </a:xfrm>
-          <a:prstGeom prst="rect">
-            <a:avLst/>
-          </a:prstGeom>
-          <a:noFill/>
-        </p:spPr>
-        <p:txBody>
-          <a:bodyPr wrap="square" rtlCol="0">
-            <a:spAutoFit/>
-          </a:bodyPr>
-          <a:lstStyle/>
-          <a:p>
-            <a:r>
-              <a:rPr lang="en-US" altLang="ko-KR" sz="1050" dirty="0">
-                <a:latin typeface="+mn-ea"/>
-                <a:ea typeface="+mn-ea"/>
-                <a:hlinkClick r:id="rId5"/>
-              </a:rPr>
-              <a:t>[Git] wocjf0513</a:t>
-            </a:r>
-            <a:endParaRPr lang="ko-KR" altLang="en-US" sz="1050" dirty="0">
-              <a:latin typeface="+mn-ea"/>
-              <a:ea typeface="+mn-ea"/>
-            </a:endParaRPr>
-          </a:p>
-        </p:txBody>
-      </p:sp>
-      <p:sp>
-        <p:nvSpPr>
-          <p:cNvPr id="2" name="Google Shape;88;p2">
-            <a:extLst>
-              <a:ext uri="{FF2B5EF4-FFF2-40B4-BE49-F238E27FC236}">
-                <a16:creationId xmlns:a16="http://schemas.microsoft.com/office/drawing/2014/main" id="{26EC9158-9471-6B32-A8EF-9CC14027467D}"/>
-              </a:ext>
-            </a:extLst>
-          </p:cNvPr>
-          <p:cNvSpPr/>
-          <p:nvPr/>
-        </p:nvSpPr>
-        <p:spPr>
-          <a:xfrm>
-            <a:off x="493059" y="1570353"/>
-            <a:ext cx="2318303" cy="667578"/>
-          </a:xfrm>
-          <a:prstGeom prst="rect">
-            <a:avLst/>
-          </a:prstGeom>
-          <a:solidFill>
-            <a:schemeClr val="lt1"/>
-          </a:solidFill>
-          <a:ln>
-            <a:noFill/>
-          </a:ln>
-        </p:spPr>
-        <p:txBody>
-          <a:bodyPr spcFirstLastPara="1" wrap="square" lIns="91425" tIns="45700" rIns="91425" bIns="45700" anchor="ctr" anchorCtr="0">
-            <a:noAutofit/>
-          </a:bodyPr>
-          <a:lstStyle/>
-          <a:p>
-            <a:pPr marL="0" marR="0" lvl="0" indent="0" algn="ctr" rtl="0">
-              <a:spcBef>
-                <a:spcPts val="0"/>
-              </a:spcBef>
-              <a:spcAft>
-                <a:spcPts val="0"/>
-              </a:spcAft>
-              <a:buNone/>
-            </a:pPr>
-            <a:endParaRPr sz="1800" dirty="0">
-              <a:solidFill>
-                <a:schemeClr val="lt1"/>
-              </a:solidFill>
-              <a:latin typeface="+mn-ea"/>
-              <a:ea typeface="+mn-ea"/>
-              <a:cs typeface="Malgun Gothic"/>
-              <a:sym typeface="Malgun Gothic"/>
-            </a:endParaRPr>
-          </a:p>
-        </p:txBody>
-      </p:sp>
-      <p:sp>
-        <p:nvSpPr>
-          <p:cNvPr id="3" name="Google Shape;89;p2">
-            <a:extLst>
-              <a:ext uri="{FF2B5EF4-FFF2-40B4-BE49-F238E27FC236}">
-                <a16:creationId xmlns:a16="http://schemas.microsoft.com/office/drawing/2014/main" id="{2F0B3E9E-6E8A-90EA-B1E4-2D2C6F5A6AF7}"/>
-              </a:ext>
-            </a:extLst>
-          </p:cNvPr>
-          <p:cNvSpPr/>
-          <p:nvPr/>
-        </p:nvSpPr>
-        <p:spPr>
-          <a:xfrm>
-            <a:off x="534026" y="1595021"/>
-            <a:ext cx="2318303" cy="253875"/>
-          </a:xfrm>
-          <a:prstGeom prst="rect">
-            <a:avLst/>
-          </a:prstGeom>
-          <a:noFill/>
-          <a:ln>
-            <a:noFill/>
-          </a:ln>
-        </p:spPr>
-        <p:txBody>
-          <a:bodyPr spcFirstLastPara="1" wrap="square" lIns="91425" tIns="45700" rIns="91425" bIns="45700" anchor="t" anchorCtr="0">
-            <a:spAutoFit/>
-          </a:bodyPr>
-          <a:lstStyle/>
-          <a:p>
-            <a:pPr marL="0" marR="0" lvl="0" indent="0" algn="l" rtl="0">
-              <a:spcBef>
-                <a:spcPts val="0"/>
-              </a:spcBef>
-              <a:spcAft>
-                <a:spcPts val="0"/>
-              </a:spcAft>
-              <a:buNone/>
-            </a:pPr>
-            <a:r>
-              <a:rPr lang="ko-KR" altLang="en-US" sz="1050" dirty="0">
-                <a:solidFill>
-                  <a:srgbClr val="3F3F3F"/>
-                </a:solidFill>
-                <a:latin typeface="+mn-ea"/>
-                <a:ea typeface="+mn-ea"/>
-                <a:cs typeface="Ultra"/>
-                <a:sym typeface="Ultra"/>
-              </a:rPr>
-              <a:t>심재철 지원자</a:t>
-            </a:r>
-          </a:p>
-        </p:txBody>
-      </p:sp>
-      <p:sp>
-        <p:nvSpPr>
-          <p:cNvPr id="4" name="TextBox 3">
-            <a:extLst>
-              <a:ext uri="{FF2B5EF4-FFF2-40B4-BE49-F238E27FC236}">
-                <a16:creationId xmlns:a16="http://schemas.microsoft.com/office/drawing/2014/main" id="{D2333F35-FC38-7FE6-694B-4C1D71B7696F}"/>
-              </a:ext>
-            </a:extLst>
-          </p:cNvPr>
-          <p:cNvSpPr txBox="1"/>
-          <p:nvPr/>
-        </p:nvSpPr>
-        <p:spPr>
-          <a:xfrm>
-            <a:off x="528390" y="1826184"/>
+            <a:off x="528390" y="1938728"/>
             <a:ext cx="2512700" cy="253916"/>
           </a:xfrm>
           <a:prstGeom prst="rect">
@@ -10295,6 +9192,49 @@
       </p:sp>
       <p:sp>
         <p:nvSpPr>
+          <p:cNvPr id="46" name="TextBox 45">
+            <a:extLst>
+              <a:ext uri="{FF2B5EF4-FFF2-40B4-BE49-F238E27FC236}">
+                <a16:creationId xmlns:a16="http://schemas.microsoft.com/office/drawing/2014/main" id="{DF6B49FF-FF78-41AC-B6FB-68D497ED0371}"/>
+              </a:ext>
+            </a:extLst>
+          </p:cNvPr>
+          <p:cNvSpPr txBox="1"/>
+          <p:nvPr/>
+        </p:nvSpPr>
+        <p:spPr>
+          <a:xfrm>
+            <a:off x="528390" y="1938728"/>
+            <a:ext cx="2512700" cy="253916"/>
+          </a:xfrm>
+          <a:prstGeom prst="rect">
+            <a:avLst/>
+          </a:prstGeom>
+          <a:noFill/>
+        </p:spPr>
+        <p:txBody>
+          <a:bodyPr wrap="square" rtlCol="0">
+            <a:spAutoFit/>
+          </a:bodyPr>
+          <a:lstStyle/>
+          <a:p>
+            <a:r>
+              <a:rPr lang="en-US" altLang="ko-KR" sz="1050" dirty="0">
+                <a:latin typeface="+mn-ea"/>
+                <a:ea typeface="+mn-ea"/>
+                <a:hlinkClick r:id="rId7"/>
+              </a:rPr>
+              <a:t>[Git] wocjf0513</a:t>
+            </a:r>
+            <a:endParaRPr lang="ko-KR" altLang="en-US" sz="1050" dirty="0">
+              <a:latin typeface="+mn-ea"/>
+              <a:ea typeface="+mn-ea"/>
+            </a:endParaRPr>
+          </a:p>
+        </p:txBody>
+      </p:sp>
+      <p:sp>
+        <p:nvSpPr>
           <p:cNvPr id="10" name="TextBox 9">
             <a:extLst>
               <a:ext uri="{FF2B5EF4-FFF2-40B4-BE49-F238E27FC236}">
@@ -10610,6 +9550,156 @@
       </p:sp>
       <p:sp>
         <p:nvSpPr>
+          <p:cNvPr id="17" name="Google Shape;88;p2">
+            <a:extLst>
+              <a:ext uri="{FF2B5EF4-FFF2-40B4-BE49-F238E27FC236}">
+                <a16:creationId xmlns:a16="http://schemas.microsoft.com/office/drawing/2014/main" id="{6BA8DC11-0540-06B8-CDF0-90A7211D4E84}"/>
+              </a:ext>
+            </a:extLst>
+          </p:cNvPr>
+          <p:cNvSpPr/>
+          <p:nvPr/>
+        </p:nvSpPr>
+        <p:spPr>
+          <a:xfrm>
+            <a:off x="493059" y="1570353"/>
+            <a:ext cx="2318303" cy="667578"/>
+          </a:xfrm>
+          <a:prstGeom prst="rect">
+            <a:avLst/>
+          </a:prstGeom>
+          <a:solidFill>
+            <a:schemeClr val="lt1"/>
+          </a:solidFill>
+          <a:ln>
+            <a:noFill/>
+          </a:ln>
+        </p:spPr>
+        <p:txBody>
+          <a:bodyPr spcFirstLastPara="1" wrap="square" lIns="91425" tIns="45700" rIns="91425" bIns="45700" anchor="ctr" anchorCtr="0">
+            <a:noAutofit/>
+          </a:bodyPr>
+          <a:lstStyle/>
+          <a:p>
+            <a:pPr marL="0" marR="0" lvl="0" indent="0" algn="ctr" rtl="0">
+              <a:spcBef>
+                <a:spcPts val="0"/>
+              </a:spcBef>
+              <a:spcAft>
+                <a:spcPts val="0"/>
+              </a:spcAft>
+              <a:buNone/>
+            </a:pPr>
+            <a:endParaRPr sz="1800" dirty="0">
+              <a:solidFill>
+                <a:schemeClr val="lt1"/>
+              </a:solidFill>
+              <a:latin typeface="+mn-ea"/>
+              <a:ea typeface="+mn-ea"/>
+              <a:cs typeface="Malgun Gothic"/>
+              <a:sym typeface="Malgun Gothic"/>
+            </a:endParaRPr>
+          </a:p>
+        </p:txBody>
+      </p:sp>
+      <p:sp>
+        <p:nvSpPr>
+          <p:cNvPr id="18" name="Google Shape;89;p2">
+            <a:extLst>
+              <a:ext uri="{FF2B5EF4-FFF2-40B4-BE49-F238E27FC236}">
+                <a16:creationId xmlns:a16="http://schemas.microsoft.com/office/drawing/2014/main" id="{5E761D10-9904-C797-AA51-C7D7D23B2D3B}"/>
+              </a:ext>
+            </a:extLst>
+          </p:cNvPr>
+          <p:cNvSpPr/>
+          <p:nvPr/>
+        </p:nvSpPr>
+        <p:spPr>
+          <a:xfrm>
+            <a:off x="534026" y="1595021"/>
+            <a:ext cx="2318303" cy="415458"/>
+          </a:xfrm>
+          <a:prstGeom prst="rect">
+            <a:avLst/>
+          </a:prstGeom>
+          <a:noFill/>
+          <a:ln>
+            <a:noFill/>
+          </a:ln>
+        </p:spPr>
+        <p:txBody>
+          <a:bodyPr spcFirstLastPara="1" wrap="square" lIns="91425" tIns="45700" rIns="91425" bIns="45700" anchor="t" anchorCtr="0">
+            <a:spAutoFit/>
+          </a:bodyPr>
+          <a:lstStyle/>
+          <a:p>
+            <a:pPr marL="0" marR="0" lvl="0" indent="0" algn="l" rtl="0">
+              <a:spcBef>
+                <a:spcPts val="0"/>
+              </a:spcBef>
+              <a:spcAft>
+                <a:spcPts val="0"/>
+              </a:spcAft>
+              <a:buNone/>
+            </a:pPr>
+            <a:r>
+              <a:rPr lang="ko-KR" altLang="en-US" sz="1050" dirty="0">
+                <a:solidFill>
+                  <a:srgbClr val="3F3F3F"/>
+                </a:solidFill>
+                <a:latin typeface="+mn-ea"/>
+                <a:ea typeface="+mn-ea"/>
+                <a:cs typeface="Ultra"/>
+                <a:sym typeface="Ultra"/>
+              </a:rPr>
+              <a:t>백엔드 개발</a:t>
+            </a:r>
+            <a:endParaRPr lang="en-US" altLang="ko-KR" sz="1050" dirty="0">
+              <a:solidFill>
+                <a:srgbClr val="3F3F3F"/>
+              </a:solidFill>
+              <a:latin typeface="+mn-ea"/>
+              <a:ea typeface="+mn-ea"/>
+              <a:cs typeface="Ultra"/>
+              <a:sym typeface="Ultra"/>
+            </a:endParaRPr>
+          </a:p>
+          <a:p>
+            <a:pPr marL="0" marR="0" lvl="0" indent="0" algn="l" rtl="0">
+              <a:spcBef>
+                <a:spcPts val="0"/>
+              </a:spcBef>
+              <a:spcAft>
+                <a:spcPts val="0"/>
+              </a:spcAft>
+              <a:buNone/>
+            </a:pPr>
+            <a:r>
+              <a:rPr lang="ko-KR" altLang="en-US" sz="1050" dirty="0">
+                <a:solidFill>
+                  <a:srgbClr val="3F3F3F"/>
+                </a:solidFill>
+                <a:latin typeface="+mn-ea"/>
+                <a:ea typeface="+mn-ea"/>
+                <a:cs typeface="Ultra"/>
+                <a:sym typeface="Ultra"/>
+              </a:rPr>
+              <a:t>심재철 지원자</a:t>
+            </a:r>
+            <a:endParaRPr sz="1050" dirty="0">
+              <a:solidFill>
+                <a:srgbClr val="3F3F3F"/>
+              </a:solidFill>
+              <a:latin typeface="+mn-ea"/>
+              <a:ea typeface="+mn-ea"/>
+              <a:cs typeface="Ultra"/>
+              <a:sym typeface="Ultra"/>
+            </a:endParaRPr>
+          </a:p>
+        </p:txBody>
+      </p:sp>
+      <p:sp>
+        <p:nvSpPr>
           <p:cNvPr id="19" name="Google Shape;88;p2">
             <a:extLst>
               <a:ext uri="{FF2B5EF4-FFF2-40B4-BE49-F238E27FC236}">
@@ -10666,119 +9756,10 @@
       </p:sp>
       <p:sp>
         <p:nvSpPr>
-          <p:cNvPr id="2" name="Google Shape;88;p2">
+          <p:cNvPr id="20" name="TextBox 19">
             <a:extLst>
               <a:ext uri="{FF2B5EF4-FFF2-40B4-BE49-F238E27FC236}">
-                <a16:creationId xmlns:a16="http://schemas.microsoft.com/office/drawing/2014/main" id="{75097382-DBB1-00AF-C014-72770B072629}"/>
-              </a:ext>
-            </a:extLst>
-          </p:cNvPr>
-          <p:cNvSpPr/>
-          <p:nvPr/>
-        </p:nvSpPr>
-        <p:spPr>
-          <a:xfrm>
-            <a:off x="493059" y="1570353"/>
-            <a:ext cx="2318303" cy="667578"/>
-          </a:xfrm>
-          <a:prstGeom prst="rect">
-            <a:avLst/>
-          </a:prstGeom>
-          <a:solidFill>
-            <a:schemeClr val="lt1"/>
-          </a:solidFill>
-          <a:ln>
-            <a:noFill/>
-          </a:ln>
-        </p:spPr>
-        <p:txBody>
-          <a:bodyPr spcFirstLastPara="1" wrap="square" lIns="91425" tIns="45700" rIns="91425" bIns="45700" anchor="ctr" anchorCtr="0">
-            <a:noAutofit/>
-          </a:bodyPr>
-          <a:lstStyle/>
-          <a:p>
-            <a:pPr marL="0" marR="0" lvl="0" indent="0" algn="ctr" rtl="0">
-              <a:spcBef>
-                <a:spcPts val="0"/>
-              </a:spcBef>
-              <a:spcAft>
-                <a:spcPts val="0"/>
-              </a:spcAft>
-              <a:buNone/>
-            </a:pPr>
-            <a:endParaRPr sz="1800" dirty="0">
-              <a:solidFill>
-                <a:schemeClr val="lt1"/>
-              </a:solidFill>
-              <a:latin typeface="+mn-ea"/>
-              <a:ea typeface="+mn-ea"/>
-              <a:cs typeface="Malgun Gothic"/>
-              <a:sym typeface="Malgun Gothic"/>
-            </a:endParaRPr>
-          </a:p>
-        </p:txBody>
-      </p:sp>
-      <p:sp>
-        <p:nvSpPr>
-          <p:cNvPr id="3" name="Google Shape;89;p2">
-            <a:extLst>
-              <a:ext uri="{FF2B5EF4-FFF2-40B4-BE49-F238E27FC236}">
-                <a16:creationId xmlns:a16="http://schemas.microsoft.com/office/drawing/2014/main" id="{83FC8AB6-972E-3014-653F-05CD88AAF6E4}"/>
-              </a:ext>
-            </a:extLst>
-          </p:cNvPr>
-          <p:cNvSpPr/>
-          <p:nvPr/>
-        </p:nvSpPr>
-        <p:spPr>
-          <a:xfrm>
-            <a:off x="534026" y="1595021"/>
-            <a:ext cx="2318303" cy="253875"/>
-          </a:xfrm>
-          <a:prstGeom prst="rect">
-            <a:avLst/>
-          </a:prstGeom>
-          <a:noFill/>
-          <a:ln>
-            <a:noFill/>
-          </a:ln>
-        </p:spPr>
-        <p:txBody>
-          <a:bodyPr spcFirstLastPara="1" wrap="square" lIns="91425" tIns="45700" rIns="91425" bIns="45700" anchor="t" anchorCtr="0">
-            <a:spAutoFit/>
-          </a:bodyPr>
-          <a:lstStyle/>
-          <a:p>
-            <a:pPr marL="0" marR="0" lvl="0" indent="0" algn="l" rtl="0">
-              <a:spcBef>
-                <a:spcPts val="0"/>
-              </a:spcBef>
-              <a:spcAft>
-                <a:spcPts val="0"/>
-              </a:spcAft>
-              <a:buNone/>
-            </a:pPr>
-            <a:r>
-              <a:rPr lang="ko-KR" altLang="en-US" sz="1050" dirty="0">
-                <a:solidFill>
-                  <a:srgbClr val="3F3F3F"/>
-                </a:solidFill>
-                <a:latin typeface="+mn-ea"/>
-                <a:ea typeface="+mn-ea"/>
-                <a:cs typeface="Ultra"/>
-                <a:sym typeface="Ultra"/>
-              </a:rPr>
-              <a:t>심재철 지원자</a:t>
-            </a:r>
-          </a:p>
-        </p:txBody>
-      </p:sp>
-      <p:sp>
-        <p:nvSpPr>
-          <p:cNvPr id="4" name="TextBox 3">
-            <a:extLst>
-              <a:ext uri="{FF2B5EF4-FFF2-40B4-BE49-F238E27FC236}">
-                <a16:creationId xmlns:a16="http://schemas.microsoft.com/office/drawing/2014/main" id="{FC11D8CB-D5EB-2627-F376-F29E88EB7369}"/>
+                <a16:creationId xmlns:a16="http://schemas.microsoft.com/office/drawing/2014/main" id="{F120C541-F67E-3DFD-3AE9-56956904D0D8}"/>
               </a:ext>
             </a:extLst>
           </p:cNvPr>
@@ -10787,7 +9768,7 @@
         </p:nvSpPr>
         <p:spPr>
           <a:xfrm>
-            <a:off x="528390" y="1826184"/>
+            <a:off x="528390" y="1938728"/>
             <a:ext cx="2512700" cy="253916"/>
           </a:xfrm>
           <a:prstGeom prst="rect">
@@ -11633,6 +10614,156 @@
       </p:sp>
       <p:sp>
         <p:nvSpPr>
+          <p:cNvPr id="3" name="Google Shape;88;p2">
+            <a:extLst>
+              <a:ext uri="{FF2B5EF4-FFF2-40B4-BE49-F238E27FC236}">
+                <a16:creationId xmlns:a16="http://schemas.microsoft.com/office/drawing/2014/main" id="{DEB506EA-FBEB-809F-FD31-CADC8EBD0EB6}"/>
+              </a:ext>
+            </a:extLst>
+          </p:cNvPr>
+          <p:cNvSpPr/>
+          <p:nvPr/>
+        </p:nvSpPr>
+        <p:spPr>
+          <a:xfrm>
+            <a:off x="493059" y="1570353"/>
+            <a:ext cx="2318303" cy="667578"/>
+          </a:xfrm>
+          <a:prstGeom prst="rect">
+            <a:avLst/>
+          </a:prstGeom>
+          <a:solidFill>
+            <a:schemeClr val="lt1"/>
+          </a:solidFill>
+          <a:ln>
+            <a:noFill/>
+          </a:ln>
+        </p:spPr>
+        <p:txBody>
+          <a:bodyPr spcFirstLastPara="1" wrap="square" lIns="91425" tIns="45700" rIns="91425" bIns="45700" anchor="ctr" anchorCtr="0">
+            <a:noAutofit/>
+          </a:bodyPr>
+          <a:lstStyle/>
+          <a:p>
+            <a:pPr marL="0" marR="0" lvl="0" indent="0" algn="ctr" rtl="0">
+              <a:spcBef>
+                <a:spcPts val="0"/>
+              </a:spcBef>
+              <a:spcAft>
+                <a:spcPts val="0"/>
+              </a:spcAft>
+              <a:buNone/>
+            </a:pPr>
+            <a:endParaRPr sz="1800" dirty="0">
+              <a:solidFill>
+                <a:schemeClr val="lt1"/>
+              </a:solidFill>
+              <a:latin typeface="+mn-ea"/>
+              <a:ea typeface="+mn-ea"/>
+              <a:cs typeface="Malgun Gothic"/>
+              <a:sym typeface="Malgun Gothic"/>
+            </a:endParaRPr>
+          </a:p>
+        </p:txBody>
+      </p:sp>
+      <p:sp>
+        <p:nvSpPr>
+          <p:cNvPr id="4" name="Google Shape;89;p2">
+            <a:extLst>
+              <a:ext uri="{FF2B5EF4-FFF2-40B4-BE49-F238E27FC236}">
+                <a16:creationId xmlns:a16="http://schemas.microsoft.com/office/drawing/2014/main" id="{42AD655C-DF49-FE69-F474-F1BB2474D335}"/>
+              </a:ext>
+            </a:extLst>
+          </p:cNvPr>
+          <p:cNvSpPr/>
+          <p:nvPr/>
+        </p:nvSpPr>
+        <p:spPr>
+          <a:xfrm>
+            <a:off x="534026" y="1595021"/>
+            <a:ext cx="2318303" cy="415458"/>
+          </a:xfrm>
+          <a:prstGeom prst="rect">
+            <a:avLst/>
+          </a:prstGeom>
+          <a:noFill/>
+          <a:ln>
+            <a:noFill/>
+          </a:ln>
+        </p:spPr>
+        <p:txBody>
+          <a:bodyPr spcFirstLastPara="1" wrap="square" lIns="91425" tIns="45700" rIns="91425" bIns="45700" anchor="t" anchorCtr="0">
+            <a:spAutoFit/>
+          </a:bodyPr>
+          <a:lstStyle/>
+          <a:p>
+            <a:pPr marL="0" marR="0" lvl="0" indent="0" algn="l" rtl="0">
+              <a:spcBef>
+                <a:spcPts val="0"/>
+              </a:spcBef>
+              <a:spcAft>
+                <a:spcPts val="0"/>
+              </a:spcAft>
+              <a:buNone/>
+            </a:pPr>
+            <a:r>
+              <a:rPr lang="ko-KR" altLang="en-US" sz="1050" dirty="0">
+                <a:solidFill>
+                  <a:srgbClr val="3F3F3F"/>
+                </a:solidFill>
+                <a:latin typeface="+mn-ea"/>
+                <a:ea typeface="+mn-ea"/>
+                <a:cs typeface="Ultra"/>
+                <a:sym typeface="Ultra"/>
+              </a:rPr>
+              <a:t>백엔드 개발</a:t>
+            </a:r>
+            <a:endParaRPr lang="en-US" altLang="ko-KR" sz="1050" dirty="0">
+              <a:solidFill>
+                <a:srgbClr val="3F3F3F"/>
+              </a:solidFill>
+              <a:latin typeface="+mn-ea"/>
+              <a:ea typeface="+mn-ea"/>
+              <a:cs typeface="Ultra"/>
+              <a:sym typeface="Ultra"/>
+            </a:endParaRPr>
+          </a:p>
+          <a:p>
+            <a:pPr marL="0" marR="0" lvl="0" indent="0" algn="l" rtl="0">
+              <a:spcBef>
+                <a:spcPts val="0"/>
+              </a:spcBef>
+              <a:spcAft>
+                <a:spcPts val="0"/>
+              </a:spcAft>
+              <a:buNone/>
+            </a:pPr>
+            <a:r>
+              <a:rPr lang="ko-KR" altLang="en-US" sz="1050" dirty="0">
+                <a:solidFill>
+                  <a:srgbClr val="3F3F3F"/>
+                </a:solidFill>
+                <a:latin typeface="+mn-ea"/>
+                <a:ea typeface="+mn-ea"/>
+                <a:cs typeface="Ultra"/>
+                <a:sym typeface="Ultra"/>
+              </a:rPr>
+              <a:t>심재철 지원자</a:t>
+            </a:r>
+            <a:endParaRPr sz="1050" dirty="0">
+              <a:solidFill>
+                <a:srgbClr val="3F3F3F"/>
+              </a:solidFill>
+              <a:latin typeface="+mn-ea"/>
+              <a:ea typeface="+mn-ea"/>
+              <a:cs typeface="Ultra"/>
+              <a:sym typeface="Ultra"/>
+            </a:endParaRPr>
+          </a:p>
+        </p:txBody>
+      </p:sp>
+      <p:sp>
+        <p:nvSpPr>
           <p:cNvPr id="8" name="Google Shape;88;p2">
             <a:extLst>
               <a:ext uri="{FF2B5EF4-FFF2-40B4-BE49-F238E27FC236}">
@@ -11790,158 +10921,6 @@
           </a:prstGeom>
         </p:spPr>
       </p:pic>
-      <p:sp>
-        <p:nvSpPr>
-          <p:cNvPr id="11" name="Google Shape;88;p2">
-            <a:extLst>
-              <a:ext uri="{FF2B5EF4-FFF2-40B4-BE49-F238E27FC236}">
-                <a16:creationId xmlns:a16="http://schemas.microsoft.com/office/drawing/2014/main" id="{3606E253-D87C-BDFE-66FF-C33DAB5C0250}"/>
-              </a:ext>
-            </a:extLst>
-          </p:cNvPr>
-          <p:cNvSpPr/>
-          <p:nvPr/>
-        </p:nvSpPr>
-        <p:spPr>
-          <a:xfrm>
-            <a:off x="493059" y="1570353"/>
-            <a:ext cx="2318303" cy="667578"/>
-          </a:xfrm>
-          <a:prstGeom prst="rect">
-            <a:avLst/>
-          </a:prstGeom>
-          <a:solidFill>
-            <a:schemeClr val="lt1"/>
-          </a:solidFill>
-          <a:ln>
-            <a:noFill/>
-          </a:ln>
-        </p:spPr>
-        <p:txBody>
-          <a:bodyPr spcFirstLastPara="1" wrap="square" lIns="91425" tIns="45700" rIns="91425" bIns="45700" anchor="ctr" anchorCtr="0">
-            <a:noAutofit/>
-          </a:bodyPr>
-          <a:lstStyle/>
-          <a:p>
-            <a:pPr marL="0" marR="0" lvl="0" indent="0" algn="ctr" rtl="0">
-              <a:spcBef>
-                <a:spcPts val="0"/>
-              </a:spcBef>
-              <a:spcAft>
-                <a:spcPts val="0"/>
-              </a:spcAft>
-              <a:buNone/>
-            </a:pPr>
-            <a:endParaRPr sz="1800" dirty="0">
-              <a:solidFill>
-                <a:schemeClr val="lt1"/>
-              </a:solidFill>
-              <a:latin typeface="+mn-ea"/>
-              <a:ea typeface="+mn-ea"/>
-              <a:cs typeface="Malgun Gothic"/>
-              <a:sym typeface="Malgun Gothic"/>
-            </a:endParaRPr>
-          </a:p>
-        </p:txBody>
-      </p:sp>
-      <p:sp>
-        <p:nvSpPr>
-          <p:cNvPr id="12" name="Google Shape;89;p2">
-            <a:extLst>
-              <a:ext uri="{FF2B5EF4-FFF2-40B4-BE49-F238E27FC236}">
-                <a16:creationId xmlns:a16="http://schemas.microsoft.com/office/drawing/2014/main" id="{9F3649A1-1137-31CA-AB3C-8186721F76E2}"/>
-              </a:ext>
-            </a:extLst>
-          </p:cNvPr>
-          <p:cNvSpPr/>
-          <p:nvPr/>
-        </p:nvSpPr>
-        <p:spPr>
-          <a:xfrm>
-            <a:off x="534026" y="1595021"/>
-            <a:ext cx="2318303" cy="253875"/>
-          </a:xfrm>
-          <a:prstGeom prst="rect">
-            <a:avLst/>
-          </a:prstGeom>
-          <a:noFill/>
-          <a:ln>
-            <a:noFill/>
-          </a:ln>
-        </p:spPr>
-        <p:txBody>
-          <a:bodyPr spcFirstLastPara="1" wrap="square" lIns="91425" tIns="45700" rIns="91425" bIns="45700" anchor="t" anchorCtr="0">
-            <a:spAutoFit/>
-          </a:bodyPr>
-          <a:lstStyle/>
-          <a:p>
-            <a:pPr marL="0" marR="0" lvl="0" indent="0" algn="l" rtl="0">
-              <a:spcBef>
-                <a:spcPts val="0"/>
-              </a:spcBef>
-              <a:spcAft>
-                <a:spcPts val="0"/>
-              </a:spcAft>
-              <a:buNone/>
-            </a:pPr>
-            <a:r>
-              <a:rPr lang="ko-KR" altLang="en-US" sz="1050" dirty="0">
-                <a:solidFill>
-                  <a:srgbClr val="3F3F3F"/>
-                </a:solidFill>
-                <a:latin typeface="+mn-ea"/>
-                <a:ea typeface="+mn-ea"/>
-                <a:cs typeface="Ultra"/>
-                <a:sym typeface="Ultra"/>
-              </a:rPr>
-              <a:t>심재철 지원자</a:t>
-            </a:r>
-          </a:p>
-        </p:txBody>
-      </p:sp>
-      <p:sp>
-        <p:nvSpPr>
-          <p:cNvPr id="13" name="TextBox 12">
-            <a:extLst>
-              <a:ext uri="{FF2B5EF4-FFF2-40B4-BE49-F238E27FC236}">
-                <a16:creationId xmlns:a16="http://schemas.microsoft.com/office/drawing/2014/main" id="{61727693-8C1B-85A4-1A83-790946846C57}"/>
-              </a:ext>
-            </a:extLst>
-          </p:cNvPr>
-          <p:cNvSpPr txBox="1"/>
-          <p:nvPr/>
-        </p:nvSpPr>
-        <p:spPr>
-          <a:xfrm>
-            <a:off x="528390" y="1826184"/>
-            <a:ext cx="2512700" cy="253916"/>
-          </a:xfrm>
-          <a:prstGeom prst="rect">
-            <a:avLst/>
-          </a:prstGeom>
-          <a:noFill/>
-        </p:spPr>
-        <p:txBody>
-          <a:bodyPr wrap="square" rtlCol="0">
-            <a:spAutoFit/>
-          </a:bodyPr>
-          <a:lstStyle/>
-          <a:p>
-            <a:r>
-              <a:rPr lang="en-US" altLang="ko-KR" sz="1050" dirty="0">
-                <a:latin typeface="+mn-ea"/>
-                <a:ea typeface="+mn-ea"/>
-                <a:hlinkClick r:id="rId5"/>
-              </a:rPr>
-              <a:t>[Git] wocjf0513</a:t>
-            </a:r>
-            <a:endParaRPr lang="ko-KR" altLang="en-US" sz="1050" dirty="0">
-              <a:latin typeface="+mn-ea"/>
-              <a:ea typeface="+mn-ea"/>
-            </a:endParaRPr>
-          </a:p>
-        </p:txBody>
-      </p:sp>
     </p:spTree>
     <p:extLst>
       <p:ext uri="{BB962C8B-B14F-4D97-AF65-F5344CB8AC3E}">
@@ -12444,6 +11423,49 @@
       </p:sp>
       <p:sp>
         <p:nvSpPr>
+          <p:cNvPr id="53" name="TextBox 52">
+            <a:extLst>
+              <a:ext uri="{FF2B5EF4-FFF2-40B4-BE49-F238E27FC236}">
+                <a16:creationId xmlns:a16="http://schemas.microsoft.com/office/drawing/2014/main" id="{94DD4CE0-853A-4DAE-9C63-021D1C690309}"/>
+              </a:ext>
+            </a:extLst>
+          </p:cNvPr>
+          <p:cNvSpPr txBox="1"/>
+          <p:nvPr/>
+        </p:nvSpPr>
+        <p:spPr>
+          <a:xfrm>
+            <a:off x="528390" y="1938728"/>
+            <a:ext cx="2512700" cy="253916"/>
+          </a:xfrm>
+          <a:prstGeom prst="rect">
+            <a:avLst/>
+          </a:prstGeom>
+          <a:noFill/>
+        </p:spPr>
+        <p:txBody>
+          <a:bodyPr wrap="square" rtlCol="0">
+            <a:spAutoFit/>
+          </a:bodyPr>
+          <a:lstStyle/>
+          <a:p>
+            <a:r>
+              <a:rPr lang="en-US" altLang="ko-KR" sz="1050" dirty="0">
+                <a:latin typeface="+mn-ea"/>
+                <a:ea typeface="+mn-ea"/>
+                <a:hlinkClick r:id="rId6"/>
+              </a:rPr>
+              <a:t>[Git] wocjf0513</a:t>
+            </a:r>
+            <a:endParaRPr lang="ko-KR" altLang="en-US" sz="1050" dirty="0">
+              <a:latin typeface="+mn-ea"/>
+              <a:ea typeface="+mn-ea"/>
+            </a:endParaRPr>
+          </a:p>
+        </p:txBody>
+      </p:sp>
+      <p:sp>
+        <p:nvSpPr>
           <p:cNvPr id="54" name="TextBox 53">
             <a:extLst>
               <a:ext uri="{FF2B5EF4-FFF2-40B4-BE49-F238E27FC236}">
@@ -12651,7 +11673,7 @@
               <a:rPr lang="en-US" altLang="ko-KR" sz="1200" dirty="0">
                 <a:latin typeface="+mn-ea"/>
                 <a:ea typeface="+mn-ea"/>
-                <a:hlinkClick r:id="rId6"/>
+                <a:hlinkClick r:id="rId7"/>
               </a:rPr>
               <a:t>[Git] SW-09/tree/front</a:t>
             </a:r>
@@ -12718,6 +11740,156 @@
       </p:sp>
       <p:sp>
         <p:nvSpPr>
+          <p:cNvPr id="3" name="Google Shape;88;p2">
+            <a:extLst>
+              <a:ext uri="{FF2B5EF4-FFF2-40B4-BE49-F238E27FC236}">
+                <a16:creationId xmlns:a16="http://schemas.microsoft.com/office/drawing/2014/main" id="{269DEA00-7683-3BDD-90C2-8A8D33B0BBA0}"/>
+              </a:ext>
+            </a:extLst>
+          </p:cNvPr>
+          <p:cNvSpPr/>
+          <p:nvPr/>
+        </p:nvSpPr>
+        <p:spPr>
+          <a:xfrm>
+            <a:off x="493059" y="1570353"/>
+            <a:ext cx="2318303" cy="667578"/>
+          </a:xfrm>
+          <a:prstGeom prst="rect">
+            <a:avLst/>
+          </a:prstGeom>
+          <a:solidFill>
+            <a:schemeClr val="lt1"/>
+          </a:solidFill>
+          <a:ln>
+            <a:noFill/>
+          </a:ln>
+        </p:spPr>
+        <p:txBody>
+          <a:bodyPr spcFirstLastPara="1" wrap="square" lIns="91425" tIns="45700" rIns="91425" bIns="45700" anchor="ctr" anchorCtr="0">
+            <a:noAutofit/>
+          </a:bodyPr>
+          <a:lstStyle/>
+          <a:p>
+            <a:pPr marL="0" marR="0" lvl="0" indent="0" algn="ctr" rtl="0">
+              <a:spcBef>
+                <a:spcPts val="0"/>
+              </a:spcBef>
+              <a:spcAft>
+                <a:spcPts val="0"/>
+              </a:spcAft>
+              <a:buNone/>
+            </a:pPr>
+            <a:endParaRPr sz="1800" dirty="0">
+              <a:solidFill>
+                <a:schemeClr val="lt1"/>
+              </a:solidFill>
+              <a:latin typeface="+mn-ea"/>
+              <a:ea typeface="+mn-ea"/>
+              <a:cs typeface="Malgun Gothic"/>
+              <a:sym typeface="Malgun Gothic"/>
+            </a:endParaRPr>
+          </a:p>
+        </p:txBody>
+      </p:sp>
+      <p:sp>
+        <p:nvSpPr>
+          <p:cNvPr id="4" name="Google Shape;89;p2">
+            <a:extLst>
+              <a:ext uri="{FF2B5EF4-FFF2-40B4-BE49-F238E27FC236}">
+                <a16:creationId xmlns:a16="http://schemas.microsoft.com/office/drawing/2014/main" id="{67E591E8-059A-B303-8B7D-80FCA3467E8F}"/>
+              </a:ext>
+            </a:extLst>
+          </p:cNvPr>
+          <p:cNvSpPr/>
+          <p:nvPr/>
+        </p:nvSpPr>
+        <p:spPr>
+          <a:xfrm>
+            <a:off x="534026" y="1595021"/>
+            <a:ext cx="2318303" cy="415458"/>
+          </a:xfrm>
+          <a:prstGeom prst="rect">
+            <a:avLst/>
+          </a:prstGeom>
+          <a:noFill/>
+          <a:ln>
+            <a:noFill/>
+          </a:ln>
+        </p:spPr>
+        <p:txBody>
+          <a:bodyPr spcFirstLastPara="1" wrap="square" lIns="91425" tIns="45700" rIns="91425" bIns="45700" anchor="t" anchorCtr="0">
+            <a:spAutoFit/>
+          </a:bodyPr>
+          <a:lstStyle/>
+          <a:p>
+            <a:pPr marL="0" marR="0" lvl="0" indent="0" algn="l" rtl="0">
+              <a:spcBef>
+                <a:spcPts val="0"/>
+              </a:spcBef>
+              <a:spcAft>
+                <a:spcPts val="0"/>
+              </a:spcAft>
+              <a:buNone/>
+            </a:pPr>
+            <a:r>
+              <a:rPr lang="ko-KR" altLang="en-US" sz="1050" dirty="0">
+                <a:solidFill>
+                  <a:srgbClr val="3F3F3F"/>
+                </a:solidFill>
+                <a:latin typeface="+mn-ea"/>
+                <a:ea typeface="+mn-ea"/>
+                <a:cs typeface="Ultra"/>
+                <a:sym typeface="Ultra"/>
+              </a:rPr>
+              <a:t>백엔드 개발</a:t>
+            </a:r>
+            <a:endParaRPr lang="en-US" altLang="ko-KR" sz="1050" dirty="0">
+              <a:solidFill>
+                <a:srgbClr val="3F3F3F"/>
+              </a:solidFill>
+              <a:latin typeface="+mn-ea"/>
+              <a:ea typeface="+mn-ea"/>
+              <a:cs typeface="Ultra"/>
+              <a:sym typeface="Ultra"/>
+            </a:endParaRPr>
+          </a:p>
+          <a:p>
+            <a:pPr marL="0" marR="0" lvl="0" indent="0" algn="l" rtl="0">
+              <a:spcBef>
+                <a:spcPts val="0"/>
+              </a:spcBef>
+              <a:spcAft>
+                <a:spcPts val="0"/>
+              </a:spcAft>
+              <a:buNone/>
+            </a:pPr>
+            <a:r>
+              <a:rPr lang="ko-KR" altLang="en-US" sz="1050" dirty="0">
+                <a:solidFill>
+                  <a:srgbClr val="3F3F3F"/>
+                </a:solidFill>
+                <a:latin typeface="+mn-ea"/>
+                <a:ea typeface="+mn-ea"/>
+                <a:cs typeface="Ultra"/>
+                <a:sym typeface="Ultra"/>
+              </a:rPr>
+              <a:t>심재철 지원자</a:t>
+            </a:r>
+            <a:endParaRPr sz="1050" dirty="0">
+              <a:solidFill>
+                <a:srgbClr val="3F3F3F"/>
+              </a:solidFill>
+              <a:latin typeface="+mn-ea"/>
+              <a:ea typeface="+mn-ea"/>
+              <a:cs typeface="Ultra"/>
+              <a:sym typeface="Ultra"/>
+            </a:endParaRPr>
+          </a:p>
+        </p:txBody>
+      </p:sp>
+      <p:sp>
+        <p:nvSpPr>
           <p:cNvPr id="5" name="Google Shape;88;p2">
             <a:extLst>
               <a:ext uri="{FF2B5EF4-FFF2-40B4-BE49-F238E27FC236}">
@@ -12774,119 +11946,10 @@
       </p:sp>
       <p:sp>
         <p:nvSpPr>
-          <p:cNvPr id="7" name="Google Shape;88;p2">
+          <p:cNvPr id="6" name="TextBox 5">
             <a:extLst>
               <a:ext uri="{FF2B5EF4-FFF2-40B4-BE49-F238E27FC236}">
-                <a16:creationId xmlns:a16="http://schemas.microsoft.com/office/drawing/2014/main" id="{BCC5754C-E959-105D-833C-72CB9E1F8FBC}"/>
-              </a:ext>
-            </a:extLst>
-          </p:cNvPr>
-          <p:cNvSpPr/>
-          <p:nvPr/>
-        </p:nvSpPr>
-        <p:spPr>
-          <a:xfrm>
-            <a:off x="493059" y="1570353"/>
-            <a:ext cx="2318303" cy="667578"/>
-          </a:xfrm>
-          <a:prstGeom prst="rect">
-            <a:avLst/>
-          </a:prstGeom>
-          <a:solidFill>
-            <a:schemeClr val="lt1"/>
-          </a:solidFill>
-          <a:ln>
-            <a:noFill/>
-          </a:ln>
-        </p:spPr>
-        <p:txBody>
-          <a:bodyPr spcFirstLastPara="1" wrap="square" lIns="91425" tIns="45700" rIns="91425" bIns="45700" anchor="ctr" anchorCtr="0">
-            <a:noAutofit/>
-          </a:bodyPr>
-          <a:lstStyle/>
-          <a:p>
-            <a:pPr marL="0" marR="0" lvl="0" indent="0" algn="ctr" rtl="0">
-              <a:spcBef>
-                <a:spcPts val="0"/>
-              </a:spcBef>
-              <a:spcAft>
-                <a:spcPts val="0"/>
-              </a:spcAft>
-              <a:buNone/>
-            </a:pPr>
-            <a:endParaRPr sz="1800" dirty="0">
-              <a:solidFill>
-                <a:schemeClr val="lt1"/>
-              </a:solidFill>
-              <a:latin typeface="+mn-ea"/>
-              <a:ea typeface="+mn-ea"/>
-              <a:cs typeface="Malgun Gothic"/>
-              <a:sym typeface="Malgun Gothic"/>
-            </a:endParaRPr>
-          </a:p>
-        </p:txBody>
-      </p:sp>
-      <p:sp>
-        <p:nvSpPr>
-          <p:cNvPr id="8" name="Google Shape;89;p2">
-            <a:extLst>
-              <a:ext uri="{FF2B5EF4-FFF2-40B4-BE49-F238E27FC236}">
-                <a16:creationId xmlns:a16="http://schemas.microsoft.com/office/drawing/2014/main" id="{14530657-7089-0CEC-6B30-294069A9D260}"/>
-              </a:ext>
-            </a:extLst>
-          </p:cNvPr>
-          <p:cNvSpPr/>
-          <p:nvPr/>
-        </p:nvSpPr>
-        <p:spPr>
-          <a:xfrm>
-            <a:off x="534026" y="1595021"/>
-            <a:ext cx="2318303" cy="253875"/>
-          </a:xfrm>
-          <a:prstGeom prst="rect">
-            <a:avLst/>
-          </a:prstGeom>
-          <a:noFill/>
-          <a:ln>
-            <a:noFill/>
-          </a:ln>
-        </p:spPr>
-        <p:txBody>
-          <a:bodyPr spcFirstLastPara="1" wrap="square" lIns="91425" tIns="45700" rIns="91425" bIns="45700" anchor="t" anchorCtr="0">
-            <a:spAutoFit/>
-          </a:bodyPr>
-          <a:lstStyle/>
-          <a:p>
-            <a:pPr marL="0" marR="0" lvl="0" indent="0" algn="l" rtl="0">
-              <a:spcBef>
-                <a:spcPts val="0"/>
-              </a:spcBef>
-              <a:spcAft>
-                <a:spcPts val="0"/>
-              </a:spcAft>
-              <a:buNone/>
-            </a:pPr>
-            <a:r>
-              <a:rPr lang="ko-KR" altLang="en-US" sz="1050" dirty="0">
-                <a:solidFill>
-                  <a:srgbClr val="3F3F3F"/>
-                </a:solidFill>
-                <a:latin typeface="+mn-ea"/>
-                <a:ea typeface="+mn-ea"/>
-                <a:cs typeface="Ultra"/>
-                <a:sym typeface="Ultra"/>
-              </a:rPr>
-              <a:t>심재철 지원자</a:t>
-            </a:r>
-          </a:p>
-        </p:txBody>
-      </p:sp>
-      <p:sp>
-        <p:nvSpPr>
-          <p:cNvPr id="9" name="TextBox 8">
-            <a:extLst>
-              <a:ext uri="{FF2B5EF4-FFF2-40B4-BE49-F238E27FC236}">
-                <a16:creationId xmlns:a16="http://schemas.microsoft.com/office/drawing/2014/main" id="{837B3D95-BFD9-C9DD-A3A4-64945E4F3294}"/>
+                <a16:creationId xmlns:a16="http://schemas.microsoft.com/office/drawing/2014/main" id="{CA27636F-8C7B-2607-6E86-C3F693452DB2}"/>
               </a:ext>
             </a:extLst>
           </p:cNvPr>
@@ -12895,7 +11958,7 @@
         </p:nvSpPr>
         <p:spPr>
           <a:xfrm>
-            <a:off x="528390" y="1826184"/>
+            <a:off x="528390" y="1938728"/>
             <a:ext cx="2512700" cy="253916"/>
           </a:xfrm>
           <a:prstGeom prst="rect">
@@ -12913,7 +11976,7 @@
               <a:rPr lang="en-US" altLang="ko-KR" sz="1050" dirty="0">
                 <a:latin typeface="+mn-ea"/>
                 <a:ea typeface="+mn-ea"/>
-                <a:hlinkClick r:id="rId7"/>
+                <a:hlinkClick r:id="rId6"/>
               </a:rPr>
               <a:t>[Git] wocjf0513</a:t>
             </a:r>

</xml_diff>